<commit_message>
Plano Desenvolvimento - Timeline
</commit_message>
<xml_diff>
--- a/Meta1/Apresentacao Meta 1 - BD.pptx
+++ b/Meta1/Apresentacao Meta 1 - BD.pptx
@@ -134,6 +134,2952 @@
     </p:extLst>
   </p:cmAuthor>
 </p:cmAuthorLst>
+</file>
+
+<file path=ppt/diagrams/colors1.xml><?xml version="1.0" encoding="utf-8"?>
+<dgm:colorsDef xmlns:dgm="http://schemas.openxmlformats.org/drawingml/2006/diagram" xmlns:a="http://schemas.openxmlformats.org/drawingml/2006/main" uniqueId="urn:microsoft.com/office/officeart/2005/8/colors/accent1_2">
+  <dgm:title val=""/>
+  <dgm:desc val=""/>
+  <dgm:catLst>
+    <dgm:cat type="accent1" pri="11200"/>
+  </dgm:catLst>
+  <dgm:styleLbl name="node0">
+    <dgm:fillClrLst meth="repeat">
+      <a:schemeClr val="accent1"/>
+    </dgm:fillClrLst>
+    <dgm:linClrLst meth="repeat">
+      <a:schemeClr val="lt1"/>
+    </dgm:linClrLst>
+    <dgm:effectClrLst/>
+    <dgm:txLinClrLst/>
+    <dgm:txFillClrLst/>
+    <dgm:txEffectClrLst/>
+  </dgm:styleLbl>
+  <dgm:styleLbl name="alignNode1">
+    <dgm:fillClrLst meth="repeat">
+      <a:schemeClr val="accent1"/>
+    </dgm:fillClrLst>
+    <dgm:linClrLst meth="repeat">
+      <a:schemeClr val="accent1"/>
+    </dgm:linClrLst>
+    <dgm:effectClrLst/>
+    <dgm:txLinClrLst/>
+    <dgm:txFillClrLst/>
+    <dgm:txEffectClrLst/>
+  </dgm:styleLbl>
+  <dgm:styleLbl name="node1">
+    <dgm:fillClrLst meth="repeat">
+      <a:schemeClr val="accent1"/>
+    </dgm:fillClrLst>
+    <dgm:linClrLst meth="repeat">
+      <a:schemeClr val="lt1"/>
+    </dgm:linClrLst>
+    <dgm:effectClrLst/>
+    <dgm:txLinClrLst/>
+    <dgm:txFillClrLst/>
+    <dgm:txEffectClrLst/>
+  </dgm:styleLbl>
+  <dgm:styleLbl name="lnNode1">
+    <dgm:fillClrLst meth="repeat">
+      <a:schemeClr val="accent1"/>
+    </dgm:fillClrLst>
+    <dgm:linClrLst meth="repeat">
+      <a:schemeClr val="lt1"/>
+    </dgm:linClrLst>
+    <dgm:effectClrLst/>
+    <dgm:txLinClrLst/>
+    <dgm:txFillClrLst/>
+    <dgm:txEffectClrLst/>
+  </dgm:styleLbl>
+  <dgm:styleLbl name="vennNode1">
+    <dgm:fillClrLst meth="repeat">
+      <a:schemeClr val="accent1">
+        <a:alpha val="50000"/>
+      </a:schemeClr>
+    </dgm:fillClrLst>
+    <dgm:linClrLst meth="repeat">
+      <a:schemeClr val="lt1"/>
+    </dgm:linClrLst>
+    <dgm:effectClrLst/>
+    <dgm:txLinClrLst/>
+    <dgm:txFillClrLst/>
+    <dgm:txEffectClrLst/>
+  </dgm:styleLbl>
+  <dgm:styleLbl name="node2">
+    <dgm:fillClrLst meth="repeat">
+      <a:schemeClr val="accent1"/>
+    </dgm:fillClrLst>
+    <dgm:linClrLst meth="repeat">
+      <a:schemeClr val="lt1"/>
+    </dgm:linClrLst>
+    <dgm:effectClrLst/>
+    <dgm:txLinClrLst/>
+    <dgm:txFillClrLst/>
+    <dgm:txEffectClrLst/>
+  </dgm:styleLbl>
+  <dgm:styleLbl name="node3">
+    <dgm:fillClrLst meth="repeat">
+      <a:schemeClr val="accent1"/>
+    </dgm:fillClrLst>
+    <dgm:linClrLst meth="repeat">
+      <a:schemeClr val="lt1"/>
+    </dgm:linClrLst>
+    <dgm:effectClrLst/>
+    <dgm:txLinClrLst/>
+    <dgm:txFillClrLst/>
+    <dgm:txEffectClrLst/>
+  </dgm:styleLbl>
+  <dgm:styleLbl name="node4">
+    <dgm:fillClrLst meth="repeat">
+      <a:schemeClr val="accent1"/>
+    </dgm:fillClrLst>
+    <dgm:linClrLst meth="repeat">
+      <a:schemeClr val="lt1"/>
+    </dgm:linClrLst>
+    <dgm:effectClrLst/>
+    <dgm:txLinClrLst/>
+    <dgm:txFillClrLst/>
+    <dgm:txEffectClrLst/>
+  </dgm:styleLbl>
+  <dgm:styleLbl name="fgImgPlace1">
+    <dgm:fillClrLst meth="repeat">
+      <a:schemeClr val="accent1">
+        <a:tint val="50000"/>
+      </a:schemeClr>
+    </dgm:fillClrLst>
+    <dgm:linClrLst meth="repeat">
+      <a:schemeClr val="lt1"/>
+    </dgm:linClrLst>
+    <dgm:effectClrLst/>
+    <dgm:txLinClrLst/>
+    <dgm:txFillClrLst meth="repeat">
+      <a:schemeClr val="lt1"/>
+    </dgm:txFillClrLst>
+    <dgm:txEffectClrLst/>
+  </dgm:styleLbl>
+  <dgm:styleLbl name="alignImgPlace1">
+    <dgm:fillClrLst meth="repeat">
+      <a:schemeClr val="accent1">
+        <a:tint val="50000"/>
+      </a:schemeClr>
+    </dgm:fillClrLst>
+    <dgm:linClrLst meth="repeat">
+      <a:schemeClr val="lt1"/>
+    </dgm:linClrLst>
+    <dgm:effectClrLst/>
+    <dgm:txLinClrLst/>
+    <dgm:txFillClrLst meth="repeat">
+      <a:schemeClr val="lt1"/>
+    </dgm:txFillClrLst>
+    <dgm:txEffectClrLst/>
+  </dgm:styleLbl>
+  <dgm:styleLbl name="bgImgPlace1">
+    <dgm:fillClrLst meth="repeat">
+      <a:schemeClr val="accent1">
+        <a:tint val="50000"/>
+      </a:schemeClr>
+    </dgm:fillClrLst>
+    <dgm:linClrLst meth="repeat">
+      <a:schemeClr val="lt1"/>
+    </dgm:linClrLst>
+    <dgm:effectClrLst/>
+    <dgm:txLinClrLst/>
+    <dgm:txFillClrLst meth="repeat">
+      <a:schemeClr val="lt1"/>
+    </dgm:txFillClrLst>
+    <dgm:txEffectClrLst/>
+  </dgm:styleLbl>
+  <dgm:styleLbl name="sibTrans2D1">
+    <dgm:fillClrLst meth="repeat">
+      <a:schemeClr val="accent1">
+        <a:tint val="60000"/>
+      </a:schemeClr>
+    </dgm:fillClrLst>
+    <dgm:linClrLst meth="repeat">
+      <a:schemeClr val="accent1">
+        <a:tint val="60000"/>
+      </a:schemeClr>
+    </dgm:linClrLst>
+    <dgm:effectClrLst/>
+    <dgm:txLinClrLst/>
+    <dgm:txFillClrLst/>
+    <dgm:txEffectClrLst/>
+  </dgm:styleLbl>
+  <dgm:styleLbl name="fgSibTrans2D1">
+    <dgm:fillClrLst meth="repeat">
+      <a:schemeClr val="accent1">
+        <a:tint val="60000"/>
+      </a:schemeClr>
+    </dgm:fillClrLst>
+    <dgm:linClrLst meth="repeat">
+      <a:schemeClr val="accent1">
+        <a:tint val="60000"/>
+      </a:schemeClr>
+    </dgm:linClrLst>
+    <dgm:effectClrLst/>
+    <dgm:txLinClrLst/>
+    <dgm:txFillClrLst/>
+    <dgm:txEffectClrLst/>
+  </dgm:styleLbl>
+  <dgm:styleLbl name="bgSibTrans2D1">
+    <dgm:fillClrLst meth="repeat">
+      <a:schemeClr val="accent1">
+        <a:tint val="60000"/>
+      </a:schemeClr>
+    </dgm:fillClrLst>
+    <dgm:linClrLst meth="repeat">
+      <a:schemeClr val="accent1">
+        <a:tint val="60000"/>
+      </a:schemeClr>
+    </dgm:linClrLst>
+    <dgm:effectClrLst/>
+    <dgm:txLinClrLst/>
+    <dgm:txFillClrLst/>
+    <dgm:txEffectClrLst/>
+  </dgm:styleLbl>
+  <dgm:styleLbl name="sibTrans1D1">
+    <dgm:fillClrLst meth="repeat">
+      <a:schemeClr val="accent1"/>
+    </dgm:fillClrLst>
+    <dgm:linClrLst meth="repeat">
+      <a:schemeClr val="accent1"/>
+    </dgm:linClrLst>
+    <dgm:effectClrLst/>
+    <dgm:txLinClrLst/>
+    <dgm:txFillClrLst meth="repeat">
+      <a:schemeClr val="tx1"/>
+    </dgm:txFillClrLst>
+    <dgm:txEffectClrLst/>
+  </dgm:styleLbl>
+  <dgm:styleLbl name="callout">
+    <dgm:fillClrLst meth="repeat">
+      <a:schemeClr val="accent1"/>
+    </dgm:fillClrLst>
+    <dgm:linClrLst meth="repeat">
+      <a:schemeClr val="accent1">
+        <a:tint val="50000"/>
+      </a:schemeClr>
+    </dgm:linClrLst>
+    <dgm:effectClrLst/>
+    <dgm:txLinClrLst/>
+    <dgm:txFillClrLst meth="repeat">
+      <a:schemeClr val="tx1"/>
+    </dgm:txFillClrLst>
+    <dgm:txEffectClrLst/>
+  </dgm:styleLbl>
+  <dgm:styleLbl name="asst0">
+    <dgm:fillClrLst meth="repeat">
+      <a:schemeClr val="accent1"/>
+    </dgm:fillClrLst>
+    <dgm:linClrLst meth="repeat">
+      <a:schemeClr val="lt1"/>
+    </dgm:linClrLst>
+    <dgm:effectClrLst/>
+    <dgm:txLinClrLst/>
+    <dgm:txFillClrLst/>
+    <dgm:txEffectClrLst/>
+  </dgm:styleLbl>
+  <dgm:styleLbl name="asst1">
+    <dgm:fillClrLst meth="repeat">
+      <a:schemeClr val="accent1"/>
+    </dgm:fillClrLst>
+    <dgm:linClrLst meth="repeat">
+      <a:schemeClr val="lt1"/>
+    </dgm:linClrLst>
+    <dgm:effectClrLst/>
+    <dgm:txLinClrLst/>
+    <dgm:txFillClrLst/>
+    <dgm:txEffectClrLst/>
+  </dgm:styleLbl>
+  <dgm:styleLbl name="asst2">
+    <dgm:fillClrLst meth="repeat">
+      <a:schemeClr val="accent1"/>
+    </dgm:fillClrLst>
+    <dgm:linClrLst meth="repeat">
+      <a:schemeClr val="lt1"/>
+    </dgm:linClrLst>
+    <dgm:effectClrLst/>
+    <dgm:txLinClrLst/>
+    <dgm:txFillClrLst/>
+    <dgm:txEffectClrLst/>
+  </dgm:styleLbl>
+  <dgm:styleLbl name="asst3">
+    <dgm:fillClrLst meth="repeat">
+      <a:schemeClr val="accent1"/>
+    </dgm:fillClrLst>
+    <dgm:linClrLst meth="repeat">
+      <a:schemeClr val="lt1"/>
+    </dgm:linClrLst>
+    <dgm:effectClrLst/>
+    <dgm:txLinClrLst/>
+    <dgm:txFillClrLst/>
+    <dgm:txEffectClrLst/>
+  </dgm:styleLbl>
+  <dgm:styleLbl name="asst4">
+    <dgm:fillClrLst meth="repeat">
+      <a:schemeClr val="accent1"/>
+    </dgm:fillClrLst>
+    <dgm:linClrLst meth="repeat">
+      <a:schemeClr val="lt1"/>
+    </dgm:linClrLst>
+    <dgm:effectClrLst/>
+    <dgm:txLinClrLst/>
+    <dgm:txFillClrLst/>
+    <dgm:txEffectClrLst/>
+  </dgm:styleLbl>
+  <dgm:styleLbl name="parChTrans2D1">
+    <dgm:fillClrLst meth="repeat">
+      <a:schemeClr val="accent1">
+        <a:tint val="60000"/>
+      </a:schemeClr>
+    </dgm:fillClrLst>
+    <dgm:linClrLst meth="repeat">
+      <a:schemeClr val="accent1">
+        <a:tint val="60000"/>
+      </a:schemeClr>
+    </dgm:linClrLst>
+    <dgm:effectClrLst/>
+    <dgm:txLinClrLst/>
+    <dgm:txFillClrLst meth="repeat">
+      <a:schemeClr val="lt1"/>
+    </dgm:txFillClrLst>
+    <dgm:txEffectClrLst/>
+  </dgm:styleLbl>
+  <dgm:styleLbl name="parChTrans2D2">
+    <dgm:fillClrLst meth="repeat">
+      <a:schemeClr val="accent1"/>
+    </dgm:fillClrLst>
+    <dgm:linClrLst meth="repeat">
+      <a:schemeClr val="accent1"/>
+    </dgm:linClrLst>
+    <dgm:effectClrLst/>
+    <dgm:txLinClrLst/>
+    <dgm:txFillClrLst meth="repeat">
+      <a:schemeClr val="lt1"/>
+    </dgm:txFillClrLst>
+    <dgm:txEffectClrLst/>
+  </dgm:styleLbl>
+  <dgm:styleLbl name="parChTrans2D3">
+    <dgm:fillClrLst meth="repeat">
+      <a:schemeClr val="accent1"/>
+    </dgm:fillClrLst>
+    <dgm:linClrLst meth="repeat">
+      <a:schemeClr val="accent1"/>
+    </dgm:linClrLst>
+    <dgm:effectClrLst/>
+    <dgm:txLinClrLst/>
+    <dgm:txFillClrLst meth="repeat">
+      <a:schemeClr val="lt1"/>
+    </dgm:txFillClrLst>
+    <dgm:txEffectClrLst/>
+  </dgm:styleLbl>
+  <dgm:styleLbl name="parChTrans2D4">
+    <dgm:fillClrLst meth="repeat">
+      <a:schemeClr val="accent1"/>
+    </dgm:fillClrLst>
+    <dgm:linClrLst meth="repeat">
+      <a:schemeClr val="accent1"/>
+    </dgm:linClrLst>
+    <dgm:effectClrLst/>
+    <dgm:txLinClrLst/>
+    <dgm:txFillClrLst meth="repeat">
+      <a:schemeClr val="lt1"/>
+    </dgm:txFillClrLst>
+    <dgm:txEffectClrLst/>
+  </dgm:styleLbl>
+  <dgm:styleLbl name="parChTrans1D1">
+    <dgm:fillClrLst meth="repeat">
+      <a:schemeClr val="accent1"/>
+    </dgm:fillClrLst>
+    <dgm:linClrLst meth="repeat">
+      <a:schemeClr val="accent1">
+        <a:shade val="60000"/>
+      </a:schemeClr>
+    </dgm:linClrLst>
+    <dgm:effectClrLst/>
+    <dgm:txLinClrLst/>
+    <dgm:txFillClrLst meth="repeat">
+      <a:schemeClr val="tx1"/>
+    </dgm:txFillClrLst>
+    <dgm:txEffectClrLst/>
+  </dgm:styleLbl>
+  <dgm:styleLbl name="parChTrans1D2">
+    <dgm:fillClrLst meth="repeat">
+      <a:schemeClr val="accent1"/>
+    </dgm:fillClrLst>
+    <dgm:linClrLst meth="repeat">
+      <a:schemeClr val="accent1">
+        <a:shade val="60000"/>
+      </a:schemeClr>
+    </dgm:linClrLst>
+    <dgm:effectClrLst/>
+    <dgm:txLinClrLst/>
+    <dgm:txFillClrLst meth="repeat">
+      <a:schemeClr val="tx1"/>
+    </dgm:txFillClrLst>
+    <dgm:txEffectClrLst/>
+  </dgm:styleLbl>
+  <dgm:styleLbl name="parChTrans1D3">
+    <dgm:fillClrLst meth="repeat">
+      <a:schemeClr val="accent1"/>
+    </dgm:fillClrLst>
+    <dgm:linClrLst meth="repeat">
+      <a:schemeClr val="accent1">
+        <a:shade val="80000"/>
+      </a:schemeClr>
+    </dgm:linClrLst>
+    <dgm:effectClrLst/>
+    <dgm:txLinClrLst/>
+    <dgm:txFillClrLst meth="repeat">
+      <a:schemeClr val="tx1"/>
+    </dgm:txFillClrLst>
+    <dgm:txEffectClrLst/>
+  </dgm:styleLbl>
+  <dgm:styleLbl name="parChTrans1D4">
+    <dgm:fillClrLst meth="repeat">
+      <a:schemeClr val="accent1"/>
+    </dgm:fillClrLst>
+    <dgm:linClrLst meth="repeat">
+      <a:schemeClr val="accent1">
+        <a:shade val="80000"/>
+      </a:schemeClr>
+    </dgm:linClrLst>
+    <dgm:effectClrLst/>
+    <dgm:txLinClrLst/>
+    <dgm:txFillClrLst meth="repeat">
+      <a:schemeClr val="tx1"/>
+    </dgm:txFillClrLst>
+    <dgm:txEffectClrLst/>
+  </dgm:styleLbl>
+  <dgm:styleLbl name="fgAcc1">
+    <dgm:fillClrLst meth="repeat">
+      <a:schemeClr val="lt1">
+        <a:alpha val="90000"/>
+      </a:schemeClr>
+    </dgm:fillClrLst>
+    <dgm:linClrLst meth="repeat">
+      <a:schemeClr val="accent1"/>
+    </dgm:linClrLst>
+    <dgm:effectClrLst/>
+    <dgm:txLinClrLst/>
+    <dgm:txFillClrLst meth="repeat">
+      <a:schemeClr val="dk1"/>
+    </dgm:txFillClrLst>
+    <dgm:txEffectClrLst/>
+  </dgm:styleLbl>
+  <dgm:styleLbl name="conFgAcc1">
+    <dgm:fillClrLst meth="repeat">
+      <a:schemeClr val="lt1">
+        <a:alpha val="90000"/>
+      </a:schemeClr>
+    </dgm:fillClrLst>
+    <dgm:linClrLst meth="repeat">
+      <a:schemeClr val="accent1"/>
+    </dgm:linClrLst>
+    <dgm:effectClrLst/>
+    <dgm:txLinClrLst/>
+    <dgm:txFillClrLst meth="repeat">
+      <a:schemeClr val="dk1"/>
+    </dgm:txFillClrLst>
+    <dgm:txEffectClrLst/>
+  </dgm:styleLbl>
+  <dgm:styleLbl name="alignAcc1">
+    <dgm:fillClrLst meth="repeat">
+      <a:schemeClr val="lt1">
+        <a:alpha val="90000"/>
+      </a:schemeClr>
+    </dgm:fillClrLst>
+    <dgm:linClrLst meth="repeat">
+      <a:schemeClr val="accent1"/>
+    </dgm:linClrLst>
+    <dgm:effectClrLst/>
+    <dgm:txLinClrLst/>
+    <dgm:txFillClrLst meth="repeat">
+      <a:schemeClr val="dk1"/>
+    </dgm:txFillClrLst>
+    <dgm:txEffectClrLst/>
+  </dgm:styleLbl>
+  <dgm:styleLbl name="trAlignAcc1">
+    <dgm:fillClrLst meth="repeat">
+      <a:schemeClr val="lt1">
+        <a:alpha val="40000"/>
+      </a:schemeClr>
+    </dgm:fillClrLst>
+    <dgm:linClrLst meth="repeat">
+      <a:schemeClr val="accent1"/>
+    </dgm:linClrLst>
+    <dgm:effectClrLst/>
+    <dgm:txLinClrLst/>
+    <dgm:txFillClrLst meth="repeat">
+      <a:schemeClr val="dk1"/>
+    </dgm:txFillClrLst>
+    <dgm:txEffectClrLst/>
+  </dgm:styleLbl>
+  <dgm:styleLbl name="bgAcc1">
+    <dgm:fillClrLst meth="repeat">
+      <a:schemeClr val="lt1">
+        <a:alpha val="90000"/>
+      </a:schemeClr>
+    </dgm:fillClrLst>
+    <dgm:linClrLst meth="repeat">
+      <a:schemeClr val="accent1"/>
+    </dgm:linClrLst>
+    <dgm:effectClrLst/>
+    <dgm:txLinClrLst/>
+    <dgm:txFillClrLst meth="repeat">
+      <a:schemeClr val="dk1"/>
+    </dgm:txFillClrLst>
+    <dgm:txEffectClrLst/>
+  </dgm:styleLbl>
+  <dgm:styleLbl name="solidFgAcc1">
+    <dgm:fillClrLst meth="repeat">
+      <a:schemeClr val="lt1"/>
+    </dgm:fillClrLst>
+    <dgm:linClrLst meth="repeat">
+      <a:schemeClr val="accent1"/>
+    </dgm:linClrLst>
+    <dgm:effectClrLst/>
+    <dgm:txLinClrLst/>
+    <dgm:txFillClrLst meth="repeat">
+      <a:schemeClr val="dk1"/>
+    </dgm:txFillClrLst>
+    <dgm:txEffectClrLst/>
+  </dgm:styleLbl>
+  <dgm:styleLbl name="solidAlignAcc1">
+    <dgm:fillClrLst meth="repeat">
+      <a:schemeClr val="lt1"/>
+    </dgm:fillClrLst>
+    <dgm:linClrLst meth="repeat">
+      <a:schemeClr val="accent1"/>
+    </dgm:linClrLst>
+    <dgm:effectClrLst/>
+    <dgm:txLinClrLst/>
+    <dgm:txFillClrLst meth="repeat">
+      <a:schemeClr val="dk1"/>
+    </dgm:txFillClrLst>
+    <dgm:txEffectClrLst/>
+  </dgm:styleLbl>
+  <dgm:styleLbl name="solidBgAcc1">
+    <dgm:fillClrLst meth="repeat">
+      <a:schemeClr val="lt1"/>
+    </dgm:fillClrLst>
+    <dgm:linClrLst meth="repeat">
+      <a:schemeClr val="accent1"/>
+    </dgm:linClrLst>
+    <dgm:effectClrLst/>
+    <dgm:txLinClrLst/>
+    <dgm:txFillClrLst meth="repeat">
+      <a:schemeClr val="dk1"/>
+    </dgm:txFillClrLst>
+    <dgm:txEffectClrLst/>
+  </dgm:styleLbl>
+  <dgm:styleLbl name="fgAccFollowNode1">
+    <dgm:fillClrLst meth="repeat">
+      <a:schemeClr val="accent1">
+        <a:alpha val="90000"/>
+        <a:tint val="40000"/>
+      </a:schemeClr>
+    </dgm:fillClrLst>
+    <dgm:linClrLst meth="repeat">
+      <a:schemeClr val="accent1">
+        <a:alpha val="90000"/>
+        <a:tint val="40000"/>
+      </a:schemeClr>
+    </dgm:linClrLst>
+    <dgm:effectClrLst/>
+    <dgm:txLinClrLst/>
+    <dgm:txFillClrLst meth="repeat">
+      <a:schemeClr val="dk1"/>
+    </dgm:txFillClrLst>
+    <dgm:txEffectClrLst/>
+  </dgm:styleLbl>
+  <dgm:styleLbl name="alignAccFollowNode1">
+    <dgm:fillClrLst meth="repeat">
+      <a:schemeClr val="accent1">
+        <a:alpha val="90000"/>
+        <a:tint val="40000"/>
+      </a:schemeClr>
+    </dgm:fillClrLst>
+    <dgm:linClrLst meth="repeat">
+      <a:schemeClr val="accent1">
+        <a:alpha val="90000"/>
+        <a:tint val="40000"/>
+      </a:schemeClr>
+    </dgm:linClrLst>
+    <dgm:effectClrLst/>
+    <dgm:txLinClrLst/>
+    <dgm:txFillClrLst meth="repeat">
+      <a:schemeClr val="dk1"/>
+    </dgm:txFillClrLst>
+    <dgm:txEffectClrLst/>
+  </dgm:styleLbl>
+  <dgm:styleLbl name="bgAccFollowNode1">
+    <dgm:fillClrLst meth="repeat">
+      <a:schemeClr val="accent1">
+        <a:alpha val="90000"/>
+        <a:tint val="40000"/>
+      </a:schemeClr>
+    </dgm:fillClrLst>
+    <dgm:linClrLst meth="repeat">
+      <a:schemeClr val="accent1">
+        <a:alpha val="90000"/>
+        <a:tint val="40000"/>
+      </a:schemeClr>
+    </dgm:linClrLst>
+    <dgm:effectClrLst/>
+    <dgm:txLinClrLst/>
+    <dgm:txFillClrLst meth="repeat">
+      <a:schemeClr val="dk1"/>
+    </dgm:txFillClrLst>
+    <dgm:txEffectClrLst/>
+  </dgm:styleLbl>
+  <dgm:styleLbl name="fgAcc0">
+    <dgm:fillClrLst meth="repeat">
+      <a:schemeClr val="lt1">
+        <a:alpha val="90000"/>
+      </a:schemeClr>
+    </dgm:fillClrLst>
+    <dgm:linClrLst meth="repeat">
+      <a:schemeClr val="accent1"/>
+    </dgm:linClrLst>
+    <dgm:effectClrLst/>
+    <dgm:txLinClrLst/>
+    <dgm:txFillClrLst meth="repeat">
+      <a:schemeClr val="dk1"/>
+    </dgm:txFillClrLst>
+    <dgm:txEffectClrLst/>
+  </dgm:styleLbl>
+  <dgm:styleLbl name="fgAcc2">
+    <dgm:fillClrLst meth="repeat">
+      <a:schemeClr val="lt1">
+        <a:alpha val="90000"/>
+      </a:schemeClr>
+    </dgm:fillClrLst>
+    <dgm:linClrLst meth="repeat">
+      <a:schemeClr val="accent1"/>
+    </dgm:linClrLst>
+    <dgm:effectClrLst/>
+    <dgm:txLinClrLst/>
+    <dgm:txFillClrLst meth="repeat">
+      <a:schemeClr val="dk1"/>
+    </dgm:txFillClrLst>
+    <dgm:txEffectClrLst/>
+  </dgm:styleLbl>
+  <dgm:styleLbl name="fgAcc3">
+    <dgm:fillClrLst meth="repeat">
+      <a:schemeClr val="lt1">
+        <a:alpha val="90000"/>
+      </a:schemeClr>
+    </dgm:fillClrLst>
+    <dgm:linClrLst meth="repeat">
+      <a:schemeClr val="accent1"/>
+    </dgm:linClrLst>
+    <dgm:effectClrLst/>
+    <dgm:txLinClrLst/>
+    <dgm:txFillClrLst meth="repeat">
+      <a:schemeClr val="dk1"/>
+    </dgm:txFillClrLst>
+    <dgm:txEffectClrLst/>
+  </dgm:styleLbl>
+  <dgm:styleLbl name="fgAcc4">
+    <dgm:fillClrLst meth="repeat">
+      <a:schemeClr val="lt1">
+        <a:alpha val="90000"/>
+      </a:schemeClr>
+    </dgm:fillClrLst>
+    <dgm:linClrLst meth="repeat">
+      <a:schemeClr val="accent1"/>
+    </dgm:linClrLst>
+    <dgm:effectClrLst/>
+    <dgm:txLinClrLst/>
+    <dgm:txFillClrLst meth="repeat">
+      <a:schemeClr val="dk1"/>
+    </dgm:txFillClrLst>
+    <dgm:txEffectClrLst/>
+  </dgm:styleLbl>
+  <dgm:styleLbl name="bgShp">
+    <dgm:fillClrLst meth="repeat">
+      <a:schemeClr val="accent1">
+        <a:tint val="40000"/>
+      </a:schemeClr>
+    </dgm:fillClrLst>
+    <dgm:linClrLst meth="repeat">
+      <a:schemeClr val="accent1"/>
+    </dgm:linClrLst>
+    <dgm:effectClrLst/>
+    <dgm:txLinClrLst/>
+    <dgm:txFillClrLst meth="repeat">
+      <a:schemeClr val="dk1"/>
+    </dgm:txFillClrLst>
+    <dgm:txEffectClrLst/>
+  </dgm:styleLbl>
+  <dgm:styleLbl name="dkBgShp">
+    <dgm:fillClrLst meth="repeat">
+      <a:schemeClr val="accent1">
+        <a:shade val="80000"/>
+      </a:schemeClr>
+    </dgm:fillClrLst>
+    <dgm:linClrLst meth="repeat">
+      <a:schemeClr val="accent1"/>
+    </dgm:linClrLst>
+    <dgm:effectClrLst/>
+    <dgm:txLinClrLst/>
+    <dgm:txFillClrLst meth="repeat">
+      <a:schemeClr val="lt1"/>
+    </dgm:txFillClrLst>
+    <dgm:txEffectClrLst/>
+  </dgm:styleLbl>
+  <dgm:styleLbl name="trBgShp">
+    <dgm:fillClrLst meth="repeat">
+      <a:schemeClr val="accent1">
+        <a:tint val="50000"/>
+        <a:alpha val="40000"/>
+      </a:schemeClr>
+    </dgm:fillClrLst>
+    <dgm:linClrLst meth="repeat">
+      <a:schemeClr val="accent1"/>
+    </dgm:linClrLst>
+    <dgm:effectClrLst/>
+    <dgm:txLinClrLst/>
+    <dgm:txFillClrLst meth="repeat">
+      <a:schemeClr val="lt1"/>
+    </dgm:txFillClrLst>
+    <dgm:txEffectClrLst/>
+  </dgm:styleLbl>
+  <dgm:styleLbl name="fgShp">
+    <dgm:fillClrLst meth="repeat">
+      <a:schemeClr val="accent1">
+        <a:tint val="60000"/>
+      </a:schemeClr>
+    </dgm:fillClrLst>
+    <dgm:linClrLst meth="repeat">
+      <a:schemeClr val="lt1"/>
+    </dgm:linClrLst>
+    <dgm:effectClrLst/>
+    <dgm:txLinClrLst/>
+    <dgm:txFillClrLst meth="repeat">
+      <a:schemeClr val="dk1"/>
+    </dgm:txFillClrLst>
+    <dgm:txEffectClrLst/>
+  </dgm:styleLbl>
+  <dgm:styleLbl name="revTx">
+    <dgm:fillClrLst meth="repeat">
+      <a:schemeClr val="lt1">
+        <a:alpha val="0"/>
+      </a:schemeClr>
+    </dgm:fillClrLst>
+    <dgm:linClrLst meth="repeat">
+      <a:schemeClr val="dk1">
+        <a:alpha val="0"/>
+      </a:schemeClr>
+    </dgm:linClrLst>
+    <dgm:effectClrLst/>
+    <dgm:txLinClrLst/>
+    <dgm:txFillClrLst meth="repeat">
+      <a:schemeClr val="tx1"/>
+    </dgm:txFillClrLst>
+    <dgm:txEffectClrLst/>
+  </dgm:styleLbl>
+</dgm:colorsDef>
+</file>
+
+<file path=ppt/diagrams/data1.xml><?xml version="1.0" encoding="utf-8"?>
+<dgm:dataModel xmlns:dgm="http://schemas.openxmlformats.org/drawingml/2006/diagram" xmlns:a="http://schemas.openxmlformats.org/drawingml/2006/main">
+  <dgm:ptLst>
+    <dgm:pt modelId="{19867A28-8E0A-174F-8602-3D4942F76EE2}" type="doc">
+      <dgm:prSet loTypeId="urn:microsoft.com/office/officeart/2005/8/layout/hProcess11" loCatId="" qsTypeId="urn:microsoft.com/office/officeart/2005/8/quickstyle/simple1" qsCatId="simple" csTypeId="urn:microsoft.com/office/officeart/2005/8/colors/accent1_2" csCatId="accent1" phldr="1"/>
+      <dgm:spPr/>
+    </dgm:pt>
+    <dgm:pt modelId="{47B59E53-B1FD-1C4B-83D5-34FCBDF28657}">
+      <dgm:prSet phldrT="[Texto]" custT="1"/>
+      <dgm:spPr/>
+      <dgm:t>
+        <a:bodyPr/>
+        <a:lstStyle/>
+        <a:p>
+          <a:r>
+            <a:rPr lang="pt-PT" sz="1900" dirty="0"/>
+            <a:t>Início da Meta 1</a:t>
+          </a:r>
+        </a:p>
+        <a:p>
+          <a:r>
+            <a:rPr lang="pt-PT" sz="1100" b="0" dirty="0"/>
+            <a:t>08-04-2021</a:t>
+          </a:r>
+        </a:p>
+      </dgm:t>
+    </dgm:pt>
+    <dgm:pt modelId="{F7EC4134-5CEB-DA4E-87FF-E44FBCC0AA56}" type="parTrans" cxnId="{5B7BD27D-CF44-B246-BD32-35C3D3E26205}">
+      <dgm:prSet/>
+      <dgm:spPr/>
+      <dgm:t>
+        <a:bodyPr/>
+        <a:lstStyle/>
+        <a:p>
+          <a:endParaRPr lang="pt-PT"/>
+        </a:p>
+      </dgm:t>
+    </dgm:pt>
+    <dgm:pt modelId="{384CA9E4-ADE3-3F4C-93EF-86C009110F7B}" type="sibTrans" cxnId="{5B7BD27D-CF44-B246-BD32-35C3D3E26205}">
+      <dgm:prSet/>
+      <dgm:spPr/>
+      <dgm:t>
+        <a:bodyPr/>
+        <a:lstStyle/>
+        <a:p>
+          <a:endParaRPr lang="pt-PT"/>
+        </a:p>
+      </dgm:t>
+    </dgm:pt>
+    <dgm:pt modelId="{F3B7919C-A10C-BB40-95EE-F34AF80342F3}">
+      <dgm:prSet phldrT="[Texto]" custT="1"/>
+      <dgm:spPr/>
+      <dgm:t>
+        <a:bodyPr/>
+        <a:lstStyle/>
+        <a:p>
+          <a:r>
+            <a:rPr lang="pt-PT" sz="1100" b="0" dirty="0"/>
+            <a:t>10-04-2021</a:t>
+          </a:r>
+          <a:endParaRPr lang="pt-PT" sz="1100" dirty="0"/>
+        </a:p>
+        <a:p>
+          <a:r>
+            <a:rPr lang="pt-PT" sz="1900" dirty="0"/>
+            <a:t>Desenvolvimento da Apresentação</a:t>
+          </a:r>
+        </a:p>
+      </dgm:t>
+    </dgm:pt>
+    <dgm:pt modelId="{FA452B69-6BF6-8149-9426-9A746E887F8B}" type="parTrans" cxnId="{ED6DDA6B-EA81-F54E-AB5F-B1D1911371B2}">
+      <dgm:prSet/>
+      <dgm:spPr/>
+      <dgm:t>
+        <a:bodyPr/>
+        <a:lstStyle/>
+        <a:p>
+          <a:endParaRPr lang="pt-PT"/>
+        </a:p>
+      </dgm:t>
+    </dgm:pt>
+    <dgm:pt modelId="{64A4C6A3-E6C7-094B-A8A5-68FD85B34371}" type="sibTrans" cxnId="{ED6DDA6B-EA81-F54E-AB5F-B1D1911371B2}">
+      <dgm:prSet/>
+      <dgm:spPr/>
+      <dgm:t>
+        <a:bodyPr/>
+        <a:lstStyle/>
+        <a:p>
+          <a:endParaRPr lang="pt-PT"/>
+        </a:p>
+      </dgm:t>
+    </dgm:pt>
+    <dgm:pt modelId="{7B98E45C-BBE0-A94D-B0FD-C40760C3894C}">
+      <dgm:prSet phldrT="[Texto]" custT="1"/>
+      <dgm:spPr/>
+      <dgm:t>
+        <a:bodyPr/>
+        <a:lstStyle/>
+        <a:p>
+          <a:r>
+            <a:rPr lang="pt-PT" sz="1900" dirty="0"/>
+            <a:t>Entrega da Meta 1</a:t>
+          </a:r>
+        </a:p>
+        <a:p>
+          <a:r>
+            <a:rPr lang="pt-PT" sz="1100" b="0" dirty="0"/>
+            <a:t>14-04-2021</a:t>
+          </a:r>
+          <a:endParaRPr lang="pt-PT" sz="1100" dirty="0"/>
+        </a:p>
+      </dgm:t>
+    </dgm:pt>
+    <dgm:pt modelId="{D2E01111-9666-344D-AB09-77514638DE83}" type="parTrans" cxnId="{DAA68107-7B49-D04F-983B-6BDF78E2F14C}">
+      <dgm:prSet/>
+      <dgm:spPr/>
+      <dgm:t>
+        <a:bodyPr/>
+        <a:lstStyle/>
+        <a:p>
+          <a:endParaRPr lang="pt-PT"/>
+        </a:p>
+      </dgm:t>
+    </dgm:pt>
+    <dgm:pt modelId="{D596D633-C4F3-1F4B-BA01-A7086FB0282A}" type="sibTrans" cxnId="{DAA68107-7B49-D04F-983B-6BDF78E2F14C}">
+      <dgm:prSet/>
+      <dgm:spPr/>
+      <dgm:t>
+        <a:bodyPr/>
+        <a:lstStyle/>
+        <a:p>
+          <a:endParaRPr lang="pt-PT"/>
+        </a:p>
+      </dgm:t>
+    </dgm:pt>
+    <dgm:pt modelId="{DD90320B-E777-5144-8B49-05822BBE8A37}">
+      <dgm:prSet custT="1"/>
+      <dgm:spPr/>
+      <dgm:t>
+        <a:bodyPr/>
+        <a:lstStyle/>
+        <a:p>
+          <a:r>
+            <a:rPr lang="pt-PT" sz="1100" b="0" dirty="0"/>
+            <a:t>19-04-2021</a:t>
+          </a:r>
+          <a:endParaRPr lang="pt-PT" sz="1100" dirty="0"/>
+        </a:p>
+        <a:p>
+          <a:r>
+            <a:rPr lang="pt-PT" sz="1800" dirty="0"/>
+            <a:t>Desenvolvimento das funcionalidades pedidas</a:t>
+          </a:r>
+        </a:p>
+      </dgm:t>
+    </dgm:pt>
+    <dgm:pt modelId="{A18DEF8F-6C69-EA4B-B386-9F3214DD2A1A}" type="parTrans" cxnId="{DB4041F5-16EF-CF42-BA7A-63C833BC5CFE}">
+      <dgm:prSet/>
+      <dgm:spPr/>
+      <dgm:t>
+        <a:bodyPr/>
+        <a:lstStyle/>
+        <a:p>
+          <a:endParaRPr lang="pt-PT"/>
+        </a:p>
+      </dgm:t>
+    </dgm:pt>
+    <dgm:pt modelId="{3A13A593-A01C-3C48-AABB-B876F2D1DBC6}" type="sibTrans" cxnId="{DB4041F5-16EF-CF42-BA7A-63C833BC5CFE}">
+      <dgm:prSet/>
+      <dgm:spPr/>
+      <dgm:t>
+        <a:bodyPr/>
+        <a:lstStyle/>
+        <a:p>
+          <a:endParaRPr lang="pt-PT"/>
+        </a:p>
+      </dgm:t>
+    </dgm:pt>
+    <dgm:pt modelId="{21A10D2B-B8AA-B44B-A66D-9A35C7678F26}" type="pres">
+      <dgm:prSet presAssocID="{19867A28-8E0A-174F-8602-3D4942F76EE2}" presName="Name0" presStyleCnt="0">
+        <dgm:presLayoutVars>
+          <dgm:dir/>
+          <dgm:resizeHandles val="exact"/>
+        </dgm:presLayoutVars>
+      </dgm:prSet>
+      <dgm:spPr/>
+    </dgm:pt>
+    <dgm:pt modelId="{B9A7CFC7-2578-9D41-9176-3E35873E03CC}" type="pres">
+      <dgm:prSet presAssocID="{19867A28-8E0A-174F-8602-3D4942F76EE2}" presName="arrow" presStyleLbl="bgShp" presStyleIdx="0" presStyleCnt="1"/>
+      <dgm:spPr/>
+    </dgm:pt>
+    <dgm:pt modelId="{508077A3-DABC-F448-BE0A-E854596DB81E}" type="pres">
+      <dgm:prSet presAssocID="{19867A28-8E0A-174F-8602-3D4942F76EE2}" presName="points" presStyleCnt="0"/>
+      <dgm:spPr/>
+    </dgm:pt>
+    <dgm:pt modelId="{68977E76-9E52-BC4F-AC35-F03836558771}" type="pres">
+      <dgm:prSet presAssocID="{47B59E53-B1FD-1C4B-83D5-34FCBDF28657}" presName="compositeA" presStyleCnt="0"/>
+      <dgm:spPr/>
+    </dgm:pt>
+    <dgm:pt modelId="{CBF32A05-7824-5045-B11B-78C8ABB0D375}" type="pres">
+      <dgm:prSet presAssocID="{47B59E53-B1FD-1C4B-83D5-34FCBDF28657}" presName="textA" presStyleLbl="revTx" presStyleIdx="0" presStyleCnt="4">
+        <dgm:presLayoutVars>
+          <dgm:bulletEnabled val="1"/>
+        </dgm:presLayoutVars>
+      </dgm:prSet>
+      <dgm:spPr/>
+    </dgm:pt>
+    <dgm:pt modelId="{B977E860-A9F3-0F4E-9A01-D289138904F2}" type="pres">
+      <dgm:prSet presAssocID="{47B59E53-B1FD-1C4B-83D5-34FCBDF28657}" presName="circleA" presStyleLbl="node1" presStyleIdx="0" presStyleCnt="4"/>
+      <dgm:spPr/>
+    </dgm:pt>
+    <dgm:pt modelId="{1718CAD7-6CE6-A04C-A8D1-D5D67359C6BC}" type="pres">
+      <dgm:prSet presAssocID="{47B59E53-B1FD-1C4B-83D5-34FCBDF28657}" presName="spaceA" presStyleCnt="0"/>
+      <dgm:spPr/>
+    </dgm:pt>
+    <dgm:pt modelId="{8A42B2E7-FB91-AF40-9319-20E87BF56315}" type="pres">
+      <dgm:prSet presAssocID="{384CA9E4-ADE3-3F4C-93EF-86C009110F7B}" presName="space" presStyleCnt="0"/>
+      <dgm:spPr/>
+    </dgm:pt>
+    <dgm:pt modelId="{BEC9A608-E822-A641-9603-DF72C226464B}" type="pres">
+      <dgm:prSet presAssocID="{F3B7919C-A10C-BB40-95EE-F34AF80342F3}" presName="compositeB" presStyleCnt="0"/>
+      <dgm:spPr/>
+    </dgm:pt>
+    <dgm:pt modelId="{DCC0251D-27A9-914E-AB70-BA29048F980E}" type="pres">
+      <dgm:prSet presAssocID="{F3B7919C-A10C-BB40-95EE-F34AF80342F3}" presName="textB" presStyleLbl="revTx" presStyleIdx="1" presStyleCnt="4">
+        <dgm:presLayoutVars>
+          <dgm:bulletEnabled val="1"/>
+        </dgm:presLayoutVars>
+      </dgm:prSet>
+      <dgm:spPr/>
+    </dgm:pt>
+    <dgm:pt modelId="{49DD4BC2-EC51-E245-B12B-D3407DB6E412}" type="pres">
+      <dgm:prSet presAssocID="{F3B7919C-A10C-BB40-95EE-F34AF80342F3}" presName="circleB" presStyleLbl="node1" presStyleIdx="1" presStyleCnt="4"/>
+      <dgm:spPr/>
+    </dgm:pt>
+    <dgm:pt modelId="{C0818E51-50CF-4142-84E6-787CC6AADDF6}" type="pres">
+      <dgm:prSet presAssocID="{F3B7919C-A10C-BB40-95EE-F34AF80342F3}" presName="spaceB" presStyleCnt="0"/>
+      <dgm:spPr/>
+    </dgm:pt>
+    <dgm:pt modelId="{77F6CA39-E44D-B845-8E8D-23713FA5EFAD}" type="pres">
+      <dgm:prSet presAssocID="{64A4C6A3-E6C7-094B-A8A5-68FD85B34371}" presName="space" presStyleCnt="0"/>
+      <dgm:spPr/>
+    </dgm:pt>
+    <dgm:pt modelId="{9046085B-5A74-EC4E-A2E7-1D4E0888F551}" type="pres">
+      <dgm:prSet presAssocID="{7B98E45C-BBE0-A94D-B0FD-C40760C3894C}" presName="compositeA" presStyleCnt="0"/>
+      <dgm:spPr/>
+    </dgm:pt>
+    <dgm:pt modelId="{EFE97A2E-F366-A44A-9C26-1FC423BD57FB}" type="pres">
+      <dgm:prSet presAssocID="{7B98E45C-BBE0-A94D-B0FD-C40760C3894C}" presName="textA" presStyleLbl="revTx" presStyleIdx="2" presStyleCnt="4">
+        <dgm:presLayoutVars>
+          <dgm:bulletEnabled val="1"/>
+        </dgm:presLayoutVars>
+      </dgm:prSet>
+      <dgm:spPr/>
+    </dgm:pt>
+    <dgm:pt modelId="{AB1B50C7-24DB-304D-9711-DC3BB7E5D58A}" type="pres">
+      <dgm:prSet presAssocID="{7B98E45C-BBE0-A94D-B0FD-C40760C3894C}" presName="circleA" presStyleLbl="node1" presStyleIdx="2" presStyleCnt="4"/>
+      <dgm:spPr/>
+    </dgm:pt>
+    <dgm:pt modelId="{0F72E0E1-DD4D-7142-877E-C81D35A5D9D2}" type="pres">
+      <dgm:prSet presAssocID="{7B98E45C-BBE0-A94D-B0FD-C40760C3894C}" presName="spaceA" presStyleCnt="0"/>
+      <dgm:spPr/>
+    </dgm:pt>
+    <dgm:pt modelId="{BE6B9078-52CA-5441-A66E-4FE062782AE6}" type="pres">
+      <dgm:prSet presAssocID="{D596D633-C4F3-1F4B-BA01-A7086FB0282A}" presName="space" presStyleCnt="0"/>
+      <dgm:spPr/>
+    </dgm:pt>
+    <dgm:pt modelId="{D86AC191-2B6B-994A-9540-79F6F57A8C63}" type="pres">
+      <dgm:prSet presAssocID="{DD90320B-E777-5144-8B49-05822BBE8A37}" presName="compositeB" presStyleCnt="0"/>
+      <dgm:spPr/>
+    </dgm:pt>
+    <dgm:pt modelId="{6C8C2D3E-E8E9-E647-A201-E46DC7B58592}" type="pres">
+      <dgm:prSet presAssocID="{DD90320B-E777-5144-8B49-05822BBE8A37}" presName="textB" presStyleLbl="revTx" presStyleIdx="3" presStyleCnt="4">
+        <dgm:presLayoutVars>
+          <dgm:bulletEnabled val="1"/>
+        </dgm:presLayoutVars>
+      </dgm:prSet>
+      <dgm:spPr/>
+    </dgm:pt>
+    <dgm:pt modelId="{578F4F22-F8FC-044F-8CBD-14BFAF2AD66B}" type="pres">
+      <dgm:prSet presAssocID="{DD90320B-E777-5144-8B49-05822BBE8A37}" presName="circleB" presStyleLbl="node1" presStyleIdx="3" presStyleCnt="4"/>
+      <dgm:spPr/>
+    </dgm:pt>
+    <dgm:pt modelId="{D31D5785-B395-1343-B0D3-37F7D8023E88}" type="pres">
+      <dgm:prSet presAssocID="{DD90320B-E777-5144-8B49-05822BBE8A37}" presName="spaceB" presStyleCnt="0"/>
+      <dgm:spPr/>
+    </dgm:pt>
+  </dgm:ptLst>
+  <dgm:cxnLst>
+    <dgm:cxn modelId="{DAA68107-7B49-D04F-983B-6BDF78E2F14C}" srcId="{19867A28-8E0A-174F-8602-3D4942F76EE2}" destId="{7B98E45C-BBE0-A94D-B0FD-C40760C3894C}" srcOrd="2" destOrd="0" parTransId="{D2E01111-9666-344D-AB09-77514638DE83}" sibTransId="{D596D633-C4F3-1F4B-BA01-A7086FB0282A}"/>
+    <dgm:cxn modelId="{29087308-82C5-4D40-BB0D-D2E3A9CE7EBE}" type="presOf" srcId="{F3B7919C-A10C-BB40-95EE-F34AF80342F3}" destId="{DCC0251D-27A9-914E-AB70-BA29048F980E}" srcOrd="0" destOrd="0" presId="urn:microsoft.com/office/officeart/2005/8/layout/hProcess11"/>
+    <dgm:cxn modelId="{530EAE17-7A24-B245-97B1-E38A9C217ACB}" type="presOf" srcId="{47B59E53-B1FD-1C4B-83D5-34FCBDF28657}" destId="{CBF32A05-7824-5045-B11B-78C8ABB0D375}" srcOrd="0" destOrd="0" presId="urn:microsoft.com/office/officeart/2005/8/layout/hProcess11"/>
+    <dgm:cxn modelId="{43C1AC48-46A3-D644-BBFB-F13CD05F432F}" type="presOf" srcId="{DD90320B-E777-5144-8B49-05822BBE8A37}" destId="{6C8C2D3E-E8E9-E647-A201-E46DC7B58592}" srcOrd="0" destOrd="0" presId="urn:microsoft.com/office/officeart/2005/8/layout/hProcess11"/>
+    <dgm:cxn modelId="{ED6DDA6B-EA81-F54E-AB5F-B1D1911371B2}" srcId="{19867A28-8E0A-174F-8602-3D4942F76EE2}" destId="{F3B7919C-A10C-BB40-95EE-F34AF80342F3}" srcOrd="1" destOrd="0" parTransId="{FA452B69-6BF6-8149-9426-9A746E887F8B}" sibTransId="{64A4C6A3-E6C7-094B-A8A5-68FD85B34371}"/>
+    <dgm:cxn modelId="{5B7BD27D-CF44-B246-BD32-35C3D3E26205}" srcId="{19867A28-8E0A-174F-8602-3D4942F76EE2}" destId="{47B59E53-B1FD-1C4B-83D5-34FCBDF28657}" srcOrd="0" destOrd="0" parTransId="{F7EC4134-5CEB-DA4E-87FF-E44FBCC0AA56}" sibTransId="{384CA9E4-ADE3-3F4C-93EF-86C009110F7B}"/>
+    <dgm:cxn modelId="{661CECE3-97E2-AF4E-A844-BC485921CC6F}" type="presOf" srcId="{7B98E45C-BBE0-A94D-B0FD-C40760C3894C}" destId="{EFE97A2E-F366-A44A-9C26-1FC423BD57FB}" srcOrd="0" destOrd="0" presId="urn:microsoft.com/office/officeart/2005/8/layout/hProcess11"/>
+    <dgm:cxn modelId="{D22660E4-7F87-C445-BC58-8BD36585B959}" type="presOf" srcId="{19867A28-8E0A-174F-8602-3D4942F76EE2}" destId="{21A10D2B-B8AA-B44B-A66D-9A35C7678F26}" srcOrd="0" destOrd="0" presId="urn:microsoft.com/office/officeart/2005/8/layout/hProcess11"/>
+    <dgm:cxn modelId="{DB4041F5-16EF-CF42-BA7A-63C833BC5CFE}" srcId="{19867A28-8E0A-174F-8602-3D4942F76EE2}" destId="{DD90320B-E777-5144-8B49-05822BBE8A37}" srcOrd="3" destOrd="0" parTransId="{A18DEF8F-6C69-EA4B-B386-9F3214DD2A1A}" sibTransId="{3A13A593-A01C-3C48-AABB-B876F2D1DBC6}"/>
+    <dgm:cxn modelId="{94C8BB35-3A08-3843-BD6B-8DECA3492383}" type="presParOf" srcId="{21A10D2B-B8AA-B44B-A66D-9A35C7678F26}" destId="{B9A7CFC7-2578-9D41-9176-3E35873E03CC}" srcOrd="0" destOrd="0" presId="urn:microsoft.com/office/officeart/2005/8/layout/hProcess11"/>
+    <dgm:cxn modelId="{C96BE6C1-7146-7248-AF90-3FAD205F27F4}" type="presParOf" srcId="{21A10D2B-B8AA-B44B-A66D-9A35C7678F26}" destId="{508077A3-DABC-F448-BE0A-E854596DB81E}" srcOrd="1" destOrd="0" presId="urn:microsoft.com/office/officeart/2005/8/layout/hProcess11"/>
+    <dgm:cxn modelId="{2B79EDAE-BC10-054E-ADFA-C9E09A3E67D0}" type="presParOf" srcId="{508077A3-DABC-F448-BE0A-E854596DB81E}" destId="{68977E76-9E52-BC4F-AC35-F03836558771}" srcOrd="0" destOrd="0" presId="urn:microsoft.com/office/officeart/2005/8/layout/hProcess11"/>
+    <dgm:cxn modelId="{DCF4B9F6-D9D5-E44C-A955-719A224EAA26}" type="presParOf" srcId="{68977E76-9E52-BC4F-AC35-F03836558771}" destId="{CBF32A05-7824-5045-B11B-78C8ABB0D375}" srcOrd="0" destOrd="0" presId="urn:microsoft.com/office/officeart/2005/8/layout/hProcess11"/>
+    <dgm:cxn modelId="{4C26ABA5-6CF1-4B42-804C-AFD7035E880D}" type="presParOf" srcId="{68977E76-9E52-BC4F-AC35-F03836558771}" destId="{B977E860-A9F3-0F4E-9A01-D289138904F2}" srcOrd="1" destOrd="0" presId="urn:microsoft.com/office/officeart/2005/8/layout/hProcess11"/>
+    <dgm:cxn modelId="{9DA9B422-6590-FC44-91AB-C0CAA8381436}" type="presParOf" srcId="{68977E76-9E52-BC4F-AC35-F03836558771}" destId="{1718CAD7-6CE6-A04C-A8D1-D5D67359C6BC}" srcOrd="2" destOrd="0" presId="urn:microsoft.com/office/officeart/2005/8/layout/hProcess11"/>
+    <dgm:cxn modelId="{C29F2145-E01E-4141-B7A8-5DB55805E1D6}" type="presParOf" srcId="{508077A3-DABC-F448-BE0A-E854596DB81E}" destId="{8A42B2E7-FB91-AF40-9319-20E87BF56315}" srcOrd="1" destOrd="0" presId="urn:microsoft.com/office/officeart/2005/8/layout/hProcess11"/>
+    <dgm:cxn modelId="{6124EC02-7901-E34A-A9C2-995671948CD8}" type="presParOf" srcId="{508077A3-DABC-F448-BE0A-E854596DB81E}" destId="{BEC9A608-E822-A641-9603-DF72C226464B}" srcOrd="2" destOrd="0" presId="urn:microsoft.com/office/officeart/2005/8/layout/hProcess11"/>
+    <dgm:cxn modelId="{173E3A7E-DDF7-2C43-ADDA-1AFA830F63D2}" type="presParOf" srcId="{BEC9A608-E822-A641-9603-DF72C226464B}" destId="{DCC0251D-27A9-914E-AB70-BA29048F980E}" srcOrd="0" destOrd="0" presId="urn:microsoft.com/office/officeart/2005/8/layout/hProcess11"/>
+    <dgm:cxn modelId="{730E6174-2408-D544-A6F8-2379A722AE17}" type="presParOf" srcId="{BEC9A608-E822-A641-9603-DF72C226464B}" destId="{49DD4BC2-EC51-E245-B12B-D3407DB6E412}" srcOrd="1" destOrd="0" presId="urn:microsoft.com/office/officeart/2005/8/layout/hProcess11"/>
+    <dgm:cxn modelId="{ABD952C2-ED16-A94E-B2C8-53D2B7960EA2}" type="presParOf" srcId="{BEC9A608-E822-A641-9603-DF72C226464B}" destId="{C0818E51-50CF-4142-84E6-787CC6AADDF6}" srcOrd="2" destOrd="0" presId="urn:microsoft.com/office/officeart/2005/8/layout/hProcess11"/>
+    <dgm:cxn modelId="{874E47D0-BFF4-AA45-A24A-CB46812365AE}" type="presParOf" srcId="{508077A3-DABC-F448-BE0A-E854596DB81E}" destId="{77F6CA39-E44D-B845-8E8D-23713FA5EFAD}" srcOrd="3" destOrd="0" presId="urn:microsoft.com/office/officeart/2005/8/layout/hProcess11"/>
+    <dgm:cxn modelId="{CDF8D0D0-F861-C342-ABB7-162B87897EA9}" type="presParOf" srcId="{508077A3-DABC-F448-BE0A-E854596DB81E}" destId="{9046085B-5A74-EC4E-A2E7-1D4E0888F551}" srcOrd="4" destOrd="0" presId="urn:microsoft.com/office/officeart/2005/8/layout/hProcess11"/>
+    <dgm:cxn modelId="{E7AF1711-3B93-584F-BFE7-73701A0F44B8}" type="presParOf" srcId="{9046085B-5A74-EC4E-A2E7-1D4E0888F551}" destId="{EFE97A2E-F366-A44A-9C26-1FC423BD57FB}" srcOrd="0" destOrd="0" presId="urn:microsoft.com/office/officeart/2005/8/layout/hProcess11"/>
+    <dgm:cxn modelId="{55A43FA3-CD42-A24C-AD9B-221CB5ECA9BA}" type="presParOf" srcId="{9046085B-5A74-EC4E-A2E7-1D4E0888F551}" destId="{AB1B50C7-24DB-304D-9711-DC3BB7E5D58A}" srcOrd="1" destOrd="0" presId="urn:microsoft.com/office/officeart/2005/8/layout/hProcess11"/>
+    <dgm:cxn modelId="{6DDB0601-3B27-0B44-A40C-802750359A88}" type="presParOf" srcId="{9046085B-5A74-EC4E-A2E7-1D4E0888F551}" destId="{0F72E0E1-DD4D-7142-877E-C81D35A5D9D2}" srcOrd="2" destOrd="0" presId="urn:microsoft.com/office/officeart/2005/8/layout/hProcess11"/>
+    <dgm:cxn modelId="{27235609-A817-364C-B081-D83682599735}" type="presParOf" srcId="{508077A3-DABC-F448-BE0A-E854596DB81E}" destId="{BE6B9078-52CA-5441-A66E-4FE062782AE6}" srcOrd="5" destOrd="0" presId="urn:microsoft.com/office/officeart/2005/8/layout/hProcess11"/>
+    <dgm:cxn modelId="{B4F61F78-8B05-EF42-8536-5F3536B70F83}" type="presParOf" srcId="{508077A3-DABC-F448-BE0A-E854596DB81E}" destId="{D86AC191-2B6B-994A-9540-79F6F57A8C63}" srcOrd="6" destOrd="0" presId="urn:microsoft.com/office/officeart/2005/8/layout/hProcess11"/>
+    <dgm:cxn modelId="{75F5CE2B-5AB0-1749-B7B3-FE3069A44CD6}" type="presParOf" srcId="{D86AC191-2B6B-994A-9540-79F6F57A8C63}" destId="{6C8C2D3E-E8E9-E647-A201-E46DC7B58592}" srcOrd="0" destOrd="0" presId="urn:microsoft.com/office/officeart/2005/8/layout/hProcess11"/>
+    <dgm:cxn modelId="{536BA987-2D47-444B-905F-38D0FC05035A}" type="presParOf" srcId="{D86AC191-2B6B-994A-9540-79F6F57A8C63}" destId="{578F4F22-F8FC-044F-8CBD-14BFAF2AD66B}" srcOrd="1" destOrd="0" presId="urn:microsoft.com/office/officeart/2005/8/layout/hProcess11"/>
+    <dgm:cxn modelId="{F219DF7D-C86A-D247-9704-D43F3A46A01B}" type="presParOf" srcId="{D86AC191-2B6B-994A-9540-79F6F57A8C63}" destId="{D31D5785-B395-1343-B0D3-37F7D8023E88}" srcOrd="2" destOrd="0" presId="urn:microsoft.com/office/officeart/2005/8/layout/hProcess11"/>
+  </dgm:cxnLst>
+  <dgm:bg/>
+  <dgm:whole/>
+  <dgm:extLst>
+    <a:ext uri="http://schemas.microsoft.com/office/drawing/2008/diagram">
+      <dsp:dataModelExt xmlns:dsp="http://schemas.microsoft.com/office/drawing/2008/diagram" relId="rId6" minVer="http://schemas.openxmlformats.org/drawingml/2006/diagram"/>
+    </a:ext>
+  </dgm:extLst>
+</dgm:dataModel>
+</file>
+
+<file path=ppt/diagrams/drawing1.xml><?xml version="1.0" encoding="utf-8"?>
+<dsp:drawing xmlns:dgm="http://schemas.openxmlformats.org/drawingml/2006/diagram" xmlns:dsp="http://schemas.microsoft.com/office/drawing/2008/diagram" xmlns:a="http://schemas.openxmlformats.org/drawingml/2006/main">
+  <dsp:spTree>
+    <dsp:nvGrpSpPr>
+      <dsp:cNvPr id="0" name=""/>
+      <dsp:cNvGrpSpPr/>
+    </dsp:nvGrpSpPr>
+    <dsp:grpSpPr/>
+    <dsp:sp modelId="{B9A7CFC7-2578-9D41-9176-3E35873E03CC}">
+      <dsp:nvSpPr>
+        <dsp:cNvPr id="0" name=""/>
+        <dsp:cNvSpPr/>
+      </dsp:nvSpPr>
+      <dsp:spPr>
+        <a:xfrm>
+          <a:off x="0" y="1211580"/>
+          <a:ext cx="9872663" cy="1615440"/>
+        </a:xfrm>
+        <a:prstGeom prst="notchedRightArrow">
+          <a:avLst/>
+        </a:prstGeom>
+        <a:solidFill>
+          <a:schemeClr val="accent1">
+            <a:tint val="40000"/>
+            <a:hueOff val="0"/>
+            <a:satOff val="0"/>
+            <a:lumOff val="0"/>
+            <a:alphaOff val="0"/>
+          </a:schemeClr>
+        </a:solidFill>
+        <a:ln>
+          <a:noFill/>
+        </a:ln>
+        <a:effectLst/>
+      </dsp:spPr>
+      <dsp:style>
+        <a:lnRef idx="0">
+          <a:scrgbClr r="0" g="0" b="0"/>
+        </a:lnRef>
+        <a:fillRef idx="1">
+          <a:scrgbClr r="0" g="0" b="0"/>
+        </a:fillRef>
+        <a:effectRef idx="0">
+          <a:scrgbClr r="0" g="0" b="0"/>
+        </a:effectRef>
+        <a:fontRef idx="minor"/>
+      </dsp:style>
+    </dsp:sp>
+    <dsp:sp modelId="{CBF32A05-7824-5045-B11B-78C8ABB0D375}">
+      <dsp:nvSpPr>
+        <dsp:cNvPr id="0" name=""/>
+        <dsp:cNvSpPr/>
+      </dsp:nvSpPr>
+      <dsp:spPr>
+        <a:xfrm>
+          <a:off x="4447" y="0"/>
+          <a:ext cx="2138916" cy="1615440"/>
+        </a:xfrm>
+        <a:prstGeom prst="rect">
+          <a:avLst/>
+        </a:prstGeom>
+        <a:noFill/>
+        <a:ln>
+          <a:noFill/>
+        </a:ln>
+        <a:effectLst/>
+      </dsp:spPr>
+      <dsp:style>
+        <a:lnRef idx="0">
+          <a:scrgbClr r="0" g="0" b="0"/>
+        </a:lnRef>
+        <a:fillRef idx="0">
+          <a:scrgbClr r="0" g="0" b="0"/>
+        </a:fillRef>
+        <a:effectRef idx="0">
+          <a:scrgbClr r="0" g="0" b="0"/>
+        </a:effectRef>
+        <a:fontRef idx="minor"/>
+      </dsp:style>
+      <dsp:txBody>
+        <a:bodyPr spcFirstLastPara="0" vert="horz" wrap="square" lIns="135128" tIns="135128" rIns="135128" bIns="135128" numCol="1" spcCol="1270" anchor="b" anchorCtr="0">
+          <a:noAutofit/>
+        </a:bodyPr>
+        <a:lstStyle/>
+        <a:p>
+          <a:pPr marL="0" lvl="0" indent="0" algn="ctr" defTabSz="844550">
+            <a:lnSpc>
+              <a:spcPct val="90000"/>
+            </a:lnSpc>
+            <a:spcBef>
+              <a:spcPct val="0"/>
+            </a:spcBef>
+            <a:spcAft>
+              <a:spcPct val="35000"/>
+            </a:spcAft>
+            <a:buNone/>
+          </a:pPr>
+          <a:r>
+            <a:rPr lang="pt-PT" sz="1900" kern="1200" dirty="0"/>
+            <a:t>Início da Meta 1</a:t>
+          </a:r>
+        </a:p>
+        <a:p>
+          <a:pPr marL="0" lvl="0" indent="0" algn="ctr" defTabSz="844550">
+            <a:lnSpc>
+              <a:spcPct val="90000"/>
+            </a:lnSpc>
+            <a:spcBef>
+              <a:spcPct val="0"/>
+            </a:spcBef>
+            <a:spcAft>
+              <a:spcPct val="35000"/>
+            </a:spcAft>
+            <a:buNone/>
+          </a:pPr>
+          <a:r>
+            <a:rPr lang="pt-PT" sz="1100" b="0" kern="1200" dirty="0"/>
+            <a:t>08-04-2021</a:t>
+          </a:r>
+        </a:p>
+      </dsp:txBody>
+      <dsp:txXfrm>
+        <a:off x="4447" y="0"/>
+        <a:ext cx="2138916" cy="1615440"/>
+      </dsp:txXfrm>
+    </dsp:sp>
+    <dsp:sp modelId="{B977E860-A9F3-0F4E-9A01-D289138904F2}">
+      <dsp:nvSpPr>
+        <dsp:cNvPr id="0" name=""/>
+        <dsp:cNvSpPr/>
+      </dsp:nvSpPr>
+      <dsp:spPr>
+        <a:xfrm>
+          <a:off x="871975" y="1817370"/>
+          <a:ext cx="403860" cy="403860"/>
+        </a:xfrm>
+        <a:prstGeom prst="ellipse">
+          <a:avLst/>
+        </a:prstGeom>
+        <a:solidFill>
+          <a:schemeClr val="accent1">
+            <a:hueOff val="0"/>
+            <a:satOff val="0"/>
+            <a:lumOff val="0"/>
+            <a:alphaOff val="0"/>
+          </a:schemeClr>
+        </a:solidFill>
+        <a:ln w="19050" cap="flat" cmpd="sng" algn="ctr">
+          <a:solidFill>
+            <a:schemeClr val="lt1">
+              <a:hueOff val="0"/>
+              <a:satOff val="0"/>
+              <a:lumOff val="0"/>
+              <a:alphaOff val="0"/>
+            </a:schemeClr>
+          </a:solidFill>
+          <a:prstDash val="solid"/>
+        </a:ln>
+        <a:effectLst/>
+      </dsp:spPr>
+      <dsp:style>
+        <a:lnRef idx="2">
+          <a:scrgbClr r="0" g="0" b="0"/>
+        </a:lnRef>
+        <a:fillRef idx="1">
+          <a:scrgbClr r="0" g="0" b="0"/>
+        </a:fillRef>
+        <a:effectRef idx="0">
+          <a:scrgbClr r="0" g="0" b="0"/>
+        </a:effectRef>
+        <a:fontRef idx="minor">
+          <a:schemeClr val="lt1"/>
+        </a:fontRef>
+      </dsp:style>
+    </dsp:sp>
+    <dsp:sp modelId="{DCC0251D-27A9-914E-AB70-BA29048F980E}">
+      <dsp:nvSpPr>
+        <dsp:cNvPr id="0" name=""/>
+        <dsp:cNvSpPr/>
+      </dsp:nvSpPr>
+      <dsp:spPr>
+        <a:xfrm>
+          <a:off x="2250309" y="2423160"/>
+          <a:ext cx="2138916" cy="1615440"/>
+        </a:xfrm>
+        <a:prstGeom prst="rect">
+          <a:avLst/>
+        </a:prstGeom>
+        <a:noFill/>
+        <a:ln>
+          <a:noFill/>
+        </a:ln>
+        <a:effectLst/>
+      </dsp:spPr>
+      <dsp:style>
+        <a:lnRef idx="0">
+          <a:scrgbClr r="0" g="0" b="0"/>
+        </a:lnRef>
+        <a:fillRef idx="0">
+          <a:scrgbClr r="0" g="0" b="0"/>
+        </a:fillRef>
+        <a:effectRef idx="0">
+          <a:scrgbClr r="0" g="0" b="0"/>
+        </a:effectRef>
+        <a:fontRef idx="minor"/>
+      </dsp:style>
+      <dsp:txBody>
+        <a:bodyPr spcFirstLastPara="0" vert="horz" wrap="square" lIns="78232" tIns="78232" rIns="78232" bIns="78232" numCol="1" spcCol="1270" anchor="t" anchorCtr="0">
+          <a:noAutofit/>
+        </a:bodyPr>
+        <a:lstStyle/>
+        <a:p>
+          <a:pPr marL="0" lvl="0" indent="0" algn="ctr" defTabSz="488950">
+            <a:lnSpc>
+              <a:spcPct val="90000"/>
+            </a:lnSpc>
+            <a:spcBef>
+              <a:spcPct val="0"/>
+            </a:spcBef>
+            <a:spcAft>
+              <a:spcPct val="35000"/>
+            </a:spcAft>
+            <a:buNone/>
+          </a:pPr>
+          <a:r>
+            <a:rPr lang="pt-PT" sz="1100" b="0" kern="1200" dirty="0"/>
+            <a:t>10-04-2021</a:t>
+          </a:r>
+          <a:endParaRPr lang="pt-PT" sz="1100" kern="1200" dirty="0"/>
+        </a:p>
+        <a:p>
+          <a:pPr marL="0" lvl="0" indent="0" algn="ctr" defTabSz="488950">
+            <a:lnSpc>
+              <a:spcPct val="90000"/>
+            </a:lnSpc>
+            <a:spcBef>
+              <a:spcPct val="0"/>
+            </a:spcBef>
+            <a:spcAft>
+              <a:spcPct val="35000"/>
+            </a:spcAft>
+            <a:buNone/>
+          </a:pPr>
+          <a:r>
+            <a:rPr lang="pt-PT" sz="1900" kern="1200" dirty="0"/>
+            <a:t>Desenvolvimento da Apresentação</a:t>
+          </a:r>
+        </a:p>
+      </dsp:txBody>
+      <dsp:txXfrm>
+        <a:off x="2250309" y="2423160"/>
+        <a:ext cx="2138916" cy="1615440"/>
+      </dsp:txXfrm>
+    </dsp:sp>
+    <dsp:sp modelId="{49DD4BC2-EC51-E245-B12B-D3407DB6E412}">
+      <dsp:nvSpPr>
+        <dsp:cNvPr id="0" name=""/>
+        <dsp:cNvSpPr/>
+      </dsp:nvSpPr>
+      <dsp:spPr>
+        <a:xfrm>
+          <a:off x="3117837" y="1817370"/>
+          <a:ext cx="403860" cy="403860"/>
+        </a:xfrm>
+        <a:prstGeom prst="ellipse">
+          <a:avLst/>
+        </a:prstGeom>
+        <a:solidFill>
+          <a:schemeClr val="accent1">
+            <a:hueOff val="0"/>
+            <a:satOff val="0"/>
+            <a:lumOff val="0"/>
+            <a:alphaOff val="0"/>
+          </a:schemeClr>
+        </a:solidFill>
+        <a:ln w="19050" cap="flat" cmpd="sng" algn="ctr">
+          <a:solidFill>
+            <a:schemeClr val="lt1">
+              <a:hueOff val="0"/>
+              <a:satOff val="0"/>
+              <a:lumOff val="0"/>
+              <a:alphaOff val="0"/>
+            </a:schemeClr>
+          </a:solidFill>
+          <a:prstDash val="solid"/>
+        </a:ln>
+        <a:effectLst/>
+      </dsp:spPr>
+      <dsp:style>
+        <a:lnRef idx="2">
+          <a:scrgbClr r="0" g="0" b="0"/>
+        </a:lnRef>
+        <a:fillRef idx="1">
+          <a:scrgbClr r="0" g="0" b="0"/>
+        </a:fillRef>
+        <a:effectRef idx="0">
+          <a:scrgbClr r="0" g="0" b="0"/>
+        </a:effectRef>
+        <a:fontRef idx="minor">
+          <a:schemeClr val="lt1"/>
+        </a:fontRef>
+      </dsp:style>
+    </dsp:sp>
+    <dsp:sp modelId="{EFE97A2E-F366-A44A-9C26-1FC423BD57FB}">
+      <dsp:nvSpPr>
+        <dsp:cNvPr id="0" name=""/>
+        <dsp:cNvSpPr/>
+      </dsp:nvSpPr>
+      <dsp:spPr>
+        <a:xfrm>
+          <a:off x="4496171" y="0"/>
+          <a:ext cx="2138916" cy="1615440"/>
+        </a:xfrm>
+        <a:prstGeom prst="rect">
+          <a:avLst/>
+        </a:prstGeom>
+        <a:noFill/>
+        <a:ln>
+          <a:noFill/>
+        </a:ln>
+        <a:effectLst/>
+      </dsp:spPr>
+      <dsp:style>
+        <a:lnRef idx="0">
+          <a:scrgbClr r="0" g="0" b="0"/>
+        </a:lnRef>
+        <a:fillRef idx="0">
+          <a:scrgbClr r="0" g="0" b="0"/>
+        </a:fillRef>
+        <a:effectRef idx="0">
+          <a:scrgbClr r="0" g="0" b="0"/>
+        </a:effectRef>
+        <a:fontRef idx="minor"/>
+      </dsp:style>
+      <dsp:txBody>
+        <a:bodyPr spcFirstLastPara="0" vert="horz" wrap="square" lIns="135128" tIns="135128" rIns="135128" bIns="135128" numCol="1" spcCol="1270" anchor="b" anchorCtr="0">
+          <a:noAutofit/>
+        </a:bodyPr>
+        <a:lstStyle/>
+        <a:p>
+          <a:pPr marL="0" lvl="0" indent="0" algn="ctr" defTabSz="844550">
+            <a:lnSpc>
+              <a:spcPct val="90000"/>
+            </a:lnSpc>
+            <a:spcBef>
+              <a:spcPct val="0"/>
+            </a:spcBef>
+            <a:spcAft>
+              <a:spcPct val="35000"/>
+            </a:spcAft>
+            <a:buNone/>
+          </a:pPr>
+          <a:r>
+            <a:rPr lang="pt-PT" sz="1900" kern="1200" dirty="0"/>
+            <a:t>Entrega da Meta 1</a:t>
+          </a:r>
+        </a:p>
+        <a:p>
+          <a:pPr marL="0" lvl="0" indent="0" algn="ctr" defTabSz="844550">
+            <a:lnSpc>
+              <a:spcPct val="90000"/>
+            </a:lnSpc>
+            <a:spcBef>
+              <a:spcPct val="0"/>
+            </a:spcBef>
+            <a:spcAft>
+              <a:spcPct val="35000"/>
+            </a:spcAft>
+            <a:buNone/>
+          </a:pPr>
+          <a:r>
+            <a:rPr lang="pt-PT" sz="1100" b="0" kern="1200" dirty="0"/>
+            <a:t>14-04-2021</a:t>
+          </a:r>
+          <a:endParaRPr lang="pt-PT" sz="1100" kern="1200" dirty="0"/>
+        </a:p>
+      </dsp:txBody>
+      <dsp:txXfrm>
+        <a:off x="4496171" y="0"/>
+        <a:ext cx="2138916" cy="1615440"/>
+      </dsp:txXfrm>
+    </dsp:sp>
+    <dsp:sp modelId="{AB1B50C7-24DB-304D-9711-DC3BB7E5D58A}">
+      <dsp:nvSpPr>
+        <dsp:cNvPr id="0" name=""/>
+        <dsp:cNvSpPr/>
+      </dsp:nvSpPr>
+      <dsp:spPr>
+        <a:xfrm>
+          <a:off x="5363699" y="1817370"/>
+          <a:ext cx="403860" cy="403860"/>
+        </a:xfrm>
+        <a:prstGeom prst="ellipse">
+          <a:avLst/>
+        </a:prstGeom>
+        <a:solidFill>
+          <a:schemeClr val="accent1">
+            <a:hueOff val="0"/>
+            <a:satOff val="0"/>
+            <a:lumOff val="0"/>
+            <a:alphaOff val="0"/>
+          </a:schemeClr>
+        </a:solidFill>
+        <a:ln w="19050" cap="flat" cmpd="sng" algn="ctr">
+          <a:solidFill>
+            <a:schemeClr val="lt1">
+              <a:hueOff val="0"/>
+              <a:satOff val="0"/>
+              <a:lumOff val="0"/>
+              <a:alphaOff val="0"/>
+            </a:schemeClr>
+          </a:solidFill>
+          <a:prstDash val="solid"/>
+        </a:ln>
+        <a:effectLst/>
+      </dsp:spPr>
+      <dsp:style>
+        <a:lnRef idx="2">
+          <a:scrgbClr r="0" g="0" b="0"/>
+        </a:lnRef>
+        <a:fillRef idx="1">
+          <a:scrgbClr r="0" g="0" b="0"/>
+        </a:fillRef>
+        <a:effectRef idx="0">
+          <a:scrgbClr r="0" g="0" b="0"/>
+        </a:effectRef>
+        <a:fontRef idx="minor">
+          <a:schemeClr val="lt1"/>
+        </a:fontRef>
+      </dsp:style>
+    </dsp:sp>
+    <dsp:sp modelId="{6C8C2D3E-E8E9-E647-A201-E46DC7B58592}">
+      <dsp:nvSpPr>
+        <dsp:cNvPr id="0" name=""/>
+        <dsp:cNvSpPr/>
+      </dsp:nvSpPr>
+      <dsp:spPr>
+        <a:xfrm>
+          <a:off x="6742033" y="2423160"/>
+          <a:ext cx="2138916" cy="1615440"/>
+        </a:xfrm>
+        <a:prstGeom prst="rect">
+          <a:avLst/>
+        </a:prstGeom>
+        <a:noFill/>
+        <a:ln>
+          <a:noFill/>
+        </a:ln>
+        <a:effectLst/>
+      </dsp:spPr>
+      <dsp:style>
+        <a:lnRef idx="0">
+          <a:scrgbClr r="0" g="0" b="0"/>
+        </a:lnRef>
+        <a:fillRef idx="0">
+          <a:scrgbClr r="0" g="0" b="0"/>
+        </a:fillRef>
+        <a:effectRef idx="0">
+          <a:scrgbClr r="0" g="0" b="0"/>
+        </a:effectRef>
+        <a:fontRef idx="minor"/>
+      </dsp:style>
+      <dsp:txBody>
+        <a:bodyPr spcFirstLastPara="0" vert="horz" wrap="square" lIns="78232" tIns="78232" rIns="78232" bIns="78232" numCol="1" spcCol="1270" anchor="t" anchorCtr="0">
+          <a:noAutofit/>
+        </a:bodyPr>
+        <a:lstStyle/>
+        <a:p>
+          <a:pPr marL="0" lvl="0" indent="0" algn="ctr" defTabSz="488950">
+            <a:lnSpc>
+              <a:spcPct val="90000"/>
+            </a:lnSpc>
+            <a:spcBef>
+              <a:spcPct val="0"/>
+            </a:spcBef>
+            <a:spcAft>
+              <a:spcPct val="35000"/>
+            </a:spcAft>
+            <a:buNone/>
+          </a:pPr>
+          <a:r>
+            <a:rPr lang="pt-PT" sz="1100" b="0" kern="1200" dirty="0"/>
+            <a:t>19-04-2021</a:t>
+          </a:r>
+          <a:endParaRPr lang="pt-PT" sz="1100" kern="1200" dirty="0"/>
+        </a:p>
+        <a:p>
+          <a:pPr marL="0" lvl="0" indent="0" algn="ctr" defTabSz="488950">
+            <a:lnSpc>
+              <a:spcPct val="90000"/>
+            </a:lnSpc>
+            <a:spcBef>
+              <a:spcPct val="0"/>
+            </a:spcBef>
+            <a:spcAft>
+              <a:spcPct val="35000"/>
+            </a:spcAft>
+            <a:buNone/>
+          </a:pPr>
+          <a:r>
+            <a:rPr lang="pt-PT" sz="1800" kern="1200" dirty="0"/>
+            <a:t>Desenvolvimento das funcionalidades pedidas</a:t>
+          </a:r>
+        </a:p>
+      </dsp:txBody>
+      <dsp:txXfrm>
+        <a:off x="6742033" y="2423160"/>
+        <a:ext cx="2138916" cy="1615440"/>
+      </dsp:txXfrm>
+    </dsp:sp>
+    <dsp:sp modelId="{578F4F22-F8FC-044F-8CBD-14BFAF2AD66B}">
+      <dsp:nvSpPr>
+        <dsp:cNvPr id="0" name=""/>
+        <dsp:cNvSpPr/>
+      </dsp:nvSpPr>
+      <dsp:spPr>
+        <a:xfrm>
+          <a:off x="7609561" y="1817370"/>
+          <a:ext cx="403860" cy="403860"/>
+        </a:xfrm>
+        <a:prstGeom prst="ellipse">
+          <a:avLst/>
+        </a:prstGeom>
+        <a:solidFill>
+          <a:schemeClr val="accent1">
+            <a:hueOff val="0"/>
+            <a:satOff val="0"/>
+            <a:lumOff val="0"/>
+            <a:alphaOff val="0"/>
+          </a:schemeClr>
+        </a:solidFill>
+        <a:ln w="19050" cap="flat" cmpd="sng" algn="ctr">
+          <a:solidFill>
+            <a:schemeClr val="lt1">
+              <a:hueOff val="0"/>
+              <a:satOff val="0"/>
+              <a:lumOff val="0"/>
+              <a:alphaOff val="0"/>
+            </a:schemeClr>
+          </a:solidFill>
+          <a:prstDash val="solid"/>
+        </a:ln>
+        <a:effectLst/>
+      </dsp:spPr>
+      <dsp:style>
+        <a:lnRef idx="2">
+          <a:scrgbClr r="0" g="0" b="0"/>
+        </a:lnRef>
+        <a:fillRef idx="1">
+          <a:scrgbClr r="0" g="0" b="0"/>
+        </a:fillRef>
+        <a:effectRef idx="0">
+          <a:scrgbClr r="0" g="0" b="0"/>
+        </a:effectRef>
+        <a:fontRef idx="minor">
+          <a:schemeClr val="lt1"/>
+        </a:fontRef>
+      </dsp:style>
+    </dsp:sp>
+  </dsp:spTree>
+</dsp:drawing>
+</file>
+
+<file path=ppt/diagrams/layout1.xml><?xml version="1.0" encoding="utf-8"?>
+<dgm:layoutDef xmlns:dgm="http://schemas.openxmlformats.org/drawingml/2006/diagram" xmlns:a="http://schemas.openxmlformats.org/drawingml/2006/main" uniqueId="urn:microsoft.com/office/officeart/2005/8/layout/hProcess11">
+  <dgm:title val=""/>
+  <dgm:desc val=""/>
+  <dgm:catLst>
+    <dgm:cat type="process" pri="8000"/>
+    <dgm:cat type="convert" pri="14000"/>
+  </dgm:catLst>
+  <dgm:sampData useDef="1">
+    <dgm:dataModel>
+      <dgm:ptLst/>
+      <dgm:bg/>
+      <dgm:whole/>
+    </dgm:dataModel>
+  </dgm:sampData>
+  <dgm:styleData>
+    <dgm:dataModel>
+      <dgm:ptLst>
+        <dgm:pt modelId="0" type="doc"/>
+        <dgm:pt modelId="1"/>
+        <dgm:pt modelId="2"/>
+      </dgm:ptLst>
+      <dgm:cxnLst>
+        <dgm:cxn modelId="4" srcId="0" destId="1" srcOrd="0" destOrd="0"/>
+        <dgm:cxn modelId="5" srcId="0" destId="2" srcOrd="1" destOrd="0"/>
+      </dgm:cxnLst>
+      <dgm:bg/>
+      <dgm:whole/>
+    </dgm:dataModel>
+  </dgm:styleData>
+  <dgm:clrData>
+    <dgm:dataModel>
+      <dgm:ptLst>
+        <dgm:pt modelId="0" type="doc"/>
+        <dgm:pt modelId="1"/>
+        <dgm:pt modelId="2"/>
+        <dgm:pt modelId="3"/>
+        <dgm:pt modelId="4"/>
+      </dgm:ptLst>
+      <dgm:cxnLst>
+        <dgm:cxn modelId="5" srcId="0" destId="1" srcOrd="0" destOrd="0"/>
+        <dgm:cxn modelId="6" srcId="0" destId="2" srcOrd="1" destOrd="0"/>
+        <dgm:cxn modelId="7" srcId="0" destId="3" srcOrd="2" destOrd="0"/>
+        <dgm:cxn modelId="8" srcId="0" destId="4" srcOrd="3" destOrd="0"/>
+      </dgm:cxnLst>
+      <dgm:bg/>
+      <dgm:whole/>
+    </dgm:dataModel>
+  </dgm:clrData>
+  <dgm:layoutNode name="Name0">
+    <dgm:varLst>
+      <dgm:dir/>
+      <dgm:resizeHandles val="exact"/>
+    </dgm:varLst>
+    <dgm:alg type="composite"/>
+    <dgm:shape xmlns:r="http://schemas.openxmlformats.org/officeDocument/2006/relationships" r:blip="">
+      <dgm:adjLst/>
+    </dgm:shape>
+    <dgm:presOf/>
+    <dgm:choose name="Name1">
+      <dgm:if name="Name2" func="var" arg="dir" op="equ" val="norm">
+        <dgm:constrLst>
+          <dgm:constr type="w" for="ch" forName="arrow" refType="w"/>
+          <dgm:constr type="h" for="ch" forName="arrow" refType="h" fact="0.4"/>
+          <dgm:constr type="ctrY" for="ch" forName="arrow" refType="h" fact="0.5"/>
+          <dgm:constr type="l" for="ch" forName="arrow"/>
+          <dgm:constr type="w" for="ch" forName="points" refType="w" fact="0.9"/>
+          <dgm:constr type="h" for="ch" forName="points" refType="h"/>
+          <dgm:constr type="t" for="ch" forName="points"/>
+          <dgm:constr type="l" for="ch" forName="points"/>
+        </dgm:constrLst>
+      </dgm:if>
+      <dgm:else name="Name3">
+        <dgm:constrLst>
+          <dgm:constr type="w" for="ch" forName="arrow" refType="w"/>
+          <dgm:constr type="h" for="ch" forName="arrow" refType="h" fact="0.4"/>
+          <dgm:constr type="ctrY" for="ch" forName="arrow" refType="h" fact="0.5"/>
+          <dgm:constr type="r" for="ch" forName="arrow" refType="w"/>
+          <dgm:constr type="w" for="ch" forName="points" refType="w" fact="0.9"/>
+          <dgm:constr type="h" for="ch" forName="points" refType="h"/>
+          <dgm:constr type="t" for="ch" forName="points"/>
+          <dgm:constr type="r" for="ch" forName="points" refType="w"/>
+        </dgm:constrLst>
+      </dgm:else>
+    </dgm:choose>
+    <dgm:ruleLst/>
+    <dgm:layoutNode name="arrow" styleLbl="bgShp">
+      <dgm:alg type="sp"/>
+      <dgm:choose name="Name4">
+        <dgm:if name="Name5" func="var" arg="dir" op="equ" val="norm">
+          <dgm:shape xmlns:r="http://schemas.openxmlformats.org/officeDocument/2006/relationships" type="notchedRightArrow" r:blip="">
+            <dgm:adjLst/>
+          </dgm:shape>
+        </dgm:if>
+        <dgm:else name="Name6">
+          <dgm:shape xmlns:r="http://schemas.openxmlformats.org/officeDocument/2006/relationships" rot="180" type="notchedRightArrow" r:blip="">
+            <dgm:adjLst/>
+          </dgm:shape>
+        </dgm:else>
+      </dgm:choose>
+      <dgm:presOf/>
+      <dgm:constrLst/>
+      <dgm:ruleLst/>
+    </dgm:layoutNode>
+    <dgm:layoutNode name="points">
+      <dgm:choose name="Name7">
+        <dgm:if name="Name8" func="var" arg="dir" op="equ" val="norm">
+          <dgm:alg type="lin">
+            <dgm:param type="linDir" val="fromL"/>
+          </dgm:alg>
+        </dgm:if>
+        <dgm:else name="Name9">
+          <dgm:alg type="lin">
+            <dgm:param type="linDir" val="fromR"/>
+          </dgm:alg>
+        </dgm:else>
+      </dgm:choose>
+      <dgm:shape xmlns:r="http://schemas.openxmlformats.org/officeDocument/2006/relationships" r:blip="">
+        <dgm:adjLst/>
+      </dgm:shape>
+      <dgm:presOf/>
+      <dgm:constrLst>
+        <dgm:constr type="w" for="ch" forName="compositeA" refType="w"/>
+        <dgm:constr type="h" for="ch" forName="compositeA" refType="h"/>
+        <dgm:constr type="w" for="ch" forName="compositeB" refType="w" refFor="ch" refForName="compositeA" op="equ"/>
+        <dgm:constr type="h" for="ch" forName="compositeB" refType="h" refFor="ch" refForName="compositeA" op="equ"/>
+        <dgm:constr type="primFontSz" for="des" ptType="node" op="equ" val="65"/>
+        <dgm:constr type="w" for="ch" forName="space" refType="w" refFor="ch" refForName="compositeA" op="equ" fact="0.05"/>
+      </dgm:constrLst>
+      <dgm:ruleLst/>
+      <dgm:forEach name="Name10" axis="ch" ptType="node">
+        <dgm:choose name="Name11">
+          <dgm:if name="Name12" axis="self" ptType="node" func="posOdd" op="equ" val="1">
+            <dgm:layoutNode name="compositeA">
+              <dgm:alg type="composite"/>
+              <dgm:shape xmlns:r="http://schemas.openxmlformats.org/officeDocument/2006/relationships" r:blip="">
+                <dgm:adjLst/>
+              </dgm:shape>
+              <dgm:presOf/>
+              <dgm:constrLst>
+                <dgm:constr type="w" for="ch" forName="textA" refType="w"/>
+                <dgm:constr type="h" for="ch" forName="textA" refType="h" fact="0.4"/>
+                <dgm:constr type="t" for="ch" forName="textA"/>
+                <dgm:constr type="l" for="ch" forName="textA"/>
+                <dgm:constr type="h" for="ch" forName="circleA" refType="h" fact="0.1"/>
+                <dgm:constr type="h" for="ch" forName="circleA" refType="w" op="lte"/>
+                <dgm:constr type="w" for="ch" forName="circleA" refType="h" refFor="ch" refForName="circleA" op="equ"/>
+                <dgm:constr type="ctrY" for="ch" forName="circleA" refType="h" fact="0.5"/>
+                <dgm:constr type="ctrX" for="ch" forName="circleA" refType="w" refFor="ch" refForName="textA" fact="0.5"/>
+                <dgm:constr type="w" for="ch" forName="spaceA" refType="w"/>
+                <dgm:constr type="h" for="ch" forName="spaceA" refType="h" fact="0.4"/>
+                <dgm:constr type="b" for="ch" forName="spaceA" refType="h"/>
+                <dgm:constr type="l" for="ch" forName="spaceA"/>
+              </dgm:constrLst>
+              <dgm:ruleLst/>
+              <dgm:layoutNode name="textA" styleLbl="revTx">
+                <dgm:varLst>
+                  <dgm:bulletEnabled val="1"/>
+                </dgm:varLst>
+                <dgm:alg type="tx">
+                  <dgm:param type="txAnchorVert" val="b"/>
+                  <dgm:param type="txAnchorVertCh" val="b"/>
+                  <dgm:param type="txAnchorHorzCh" val="ctr"/>
+                </dgm:alg>
+                <dgm:shape xmlns:r="http://schemas.openxmlformats.org/officeDocument/2006/relationships" type="rect" r:blip="">
+                  <dgm:adjLst/>
+                </dgm:shape>
+                <dgm:presOf axis="desOrSelf" ptType="node"/>
+                <dgm:constrLst/>
+                <dgm:ruleLst>
+                  <dgm:rule type="primFontSz" val="5" fact="NaN" max="NaN"/>
+                </dgm:ruleLst>
+              </dgm:layoutNode>
+              <dgm:layoutNode name="circleA">
+                <dgm:alg type="sp"/>
+                <dgm:shape xmlns:r="http://schemas.openxmlformats.org/officeDocument/2006/relationships" type="ellipse" r:blip="">
+                  <dgm:adjLst/>
+                </dgm:shape>
+                <dgm:presOf/>
+                <dgm:constrLst/>
+                <dgm:ruleLst/>
+              </dgm:layoutNode>
+              <dgm:layoutNode name="spaceA">
+                <dgm:alg type="sp"/>
+                <dgm:shape xmlns:r="http://schemas.openxmlformats.org/officeDocument/2006/relationships" r:blip="">
+                  <dgm:adjLst/>
+                </dgm:shape>
+                <dgm:presOf/>
+                <dgm:constrLst/>
+                <dgm:ruleLst/>
+              </dgm:layoutNode>
+            </dgm:layoutNode>
+          </dgm:if>
+          <dgm:else name="Name13">
+            <dgm:layoutNode name="compositeB">
+              <dgm:alg type="composite"/>
+              <dgm:shape xmlns:r="http://schemas.openxmlformats.org/officeDocument/2006/relationships" r:blip="">
+                <dgm:adjLst/>
+              </dgm:shape>
+              <dgm:presOf/>
+              <dgm:constrLst>
+                <dgm:constr type="w" for="ch" forName="textB" refType="w"/>
+                <dgm:constr type="h" for="ch" forName="textB" refType="h" fact="0.4"/>
+                <dgm:constr type="b" for="ch" forName="textB" refType="h"/>
+                <dgm:constr type="l" for="ch" forName="textB"/>
+                <dgm:constr type="h" for="ch" forName="circleB" refType="h" fact="0.1"/>
+                <dgm:constr type="w" for="ch" forName="circleB" refType="h" refFor="ch" refForName="circleB" op="equ"/>
+                <dgm:constr type="h" for="ch" forName="circleB" refType="w" op="lte"/>
+                <dgm:constr type="ctrY" for="ch" forName="circleB" refType="h" fact="0.5"/>
+                <dgm:constr type="ctrX" for="ch" forName="circleB" refType="w" refFor="ch" refForName="textB" fact="0.5"/>
+                <dgm:constr type="w" for="ch" forName="spaceB" refType="w"/>
+                <dgm:constr type="h" for="ch" forName="spaceB" refType="h" fact="0.4"/>
+                <dgm:constr type="t" for="ch" forName="spaceB"/>
+                <dgm:constr type="l" for="ch" forName="spaceB"/>
+              </dgm:constrLst>
+              <dgm:ruleLst/>
+              <dgm:layoutNode name="textB" styleLbl="revTx">
+                <dgm:varLst>
+                  <dgm:bulletEnabled val="1"/>
+                </dgm:varLst>
+                <dgm:alg type="tx">
+                  <dgm:param type="txAnchorVert" val="t"/>
+                  <dgm:param type="txAnchorVertCh" val="t"/>
+                  <dgm:param type="txAnchorHorzCh" val="ctr"/>
+                </dgm:alg>
+                <dgm:shape xmlns:r="http://schemas.openxmlformats.org/officeDocument/2006/relationships" type="rect" r:blip="">
+                  <dgm:adjLst/>
+                </dgm:shape>
+                <dgm:presOf axis="desOrSelf" ptType="node"/>
+                <dgm:constrLst/>
+                <dgm:ruleLst>
+                  <dgm:rule type="primFontSz" val="5" fact="NaN" max="NaN"/>
+                </dgm:ruleLst>
+              </dgm:layoutNode>
+              <dgm:layoutNode name="circleB">
+                <dgm:alg type="sp"/>
+                <dgm:shape xmlns:r="http://schemas.openxmlformats.org/officeDocument/2006/relationships" type="ellipse" r:blip="">
+                  <dgm:adjLst/>
+                </dgm:shape>
+                <dgm:presOf/>
+                <dgm:constrLst/>
+                <dgm:ruleLst/>
+              </dgm:layoutNode>
+              <dgm:layoutNode name="spaceB">
+                <dgm:alg type="sp"/>
+                <dgm:shape xmlns:r="http://schemas.openxmlformats.org/officeDocument/2006/relationships" r:blip="">
+                  <dgm:adjLst/>
+                </dgm:shape>
+                <dgm:presOf/>
+                <dgm:constrLst/>
+                <dgm:ruleLst/>
+              </dgm:layoutNode>
+            </dgm:layoutNode>
+          </dgm:else>
+        </dgm:choose>
+        <dgm:forEach name="Name14" axis="followSib" ptType="sibTrans" cnt="1">
+          <dgm:layoutNode name="space">
+            <dgm:alg type="sp"/>
+            <dgm:shape xmlns:r="http://schemas.openxmlformats.org/officeDocument/2006/relationships" r:blip="">
+              <dgm:adjLst/>
+            </dgm:shape>
+            <dgm:presOf/>
+            <dgm:constrLst/>
+            <dgm:ruleLst/>
+          </dgm:layoutNode>
+        </dgm:forEach>
+      </dgm:forEach>
+    </dgm:layoutNode>
+  </dgm:layoutNode>
+</dgm:layoutDef>
+</file>
+
+<file path=ppt/diagrams/quickStyle1.xml><?xml version="1.0" encoding="utf-8"?>
+<dgm:styleDef xmlns:dgm="http://schemas.openxmlformats.org/drawingml/2006/diagram" xmlns:a="http://schemas.openxmlformats.org/drawingml/2006/main" uniqueId="urn:microsoft.com/office/officeart/2005/8/quickstyle/simple1">
+  <dgm:title val=""/>
+  <dgm:desc val=""/>
+  <dgm:catLst>
+    <dgm:cat type="simple" pri="10100"/>
+  </dgm:catLst>
+  <dgm:scene3d>
+    <a:camera prst="orthographicFront"/>
+    <a:lightRig rig="threePt" dir="t"/>
+  </dgm:scene3d>
+  <dgm:styleLbl name="node0">
+    <dgm:scene3d>
+      <a:camera prst="orthographicFront"/>
+      <a:lightRig rig="threePt" dir="t"/>
+    </dgm:scene3d>
+    <dgm:sp3d/>
+    <dgm:txPr/>
+    <dgm:style>
+      <a:lnRef idx="2">
+        <a:scrgbClr r="0" g="0" b="0"/>
+      </a:lnRef>
+      <a:fillRef idx="1">
+        <a:scrgbClr r="0" g="0" b="0"/>
+      </a:fillRef>
+      <a:effectRef idx="0">
+        <a:scrgbClr r="0" g="0" b="0"/>
+      </a:effectRef>
+      <a:fontRef idx="minor">
+        <a:schemeClr val="lt1"/>
+      </a:fontRef>
+    </dgm:style>
+  </dgm:styleLbl>
+  <dgm:styleLbl name="lnNode1">
+    <dgm:scene3d>
+      <a:camera prst="orthographicFront"/>
+      <a:lightRig rig="threePt" dir="t"/>
+    </dgm:scene3d>
+    <dgm:sp3d/>
+    <dgm:txPr/>
+    <dgm:style>
+      <a:lnRef idx="2">
+        <a:scrgbClr r="0" g="0" b="0"/>
+      </a:lnRef>
+      <a:fillRef idx="1">
+        <a:scrgbClr r="0" g="0" b="0"/>
+      </a:fillRef>
+      <a:effectRef idx="0">
+        <a:scrgbClr r="0" g="0" b="0"/>
+      </a:effectRef>
+      <a:fontRef idx="minor">
+        <a:schemeClr val="lt1"/>
+      </a:fontRef>
+    </dgm:style>
+  </dgm:styleLbl>
+  <dgm:styleLbl name="vennNode1">
+    <dgm:scene3d>
+      <a:camera prst="orthographicFront"/>
+      <a:lightRig rig="threePt" dir="t"/>
+    </dgm:scene3d>
+    <dgm:sp3d/>
+    <dgm:txPr/>
+    <dgm:style>
+      <a:lnRef idx="2">
+        <a:scrgbClr r="0" g="0" b="0"/>
+      </a:lnRef>
+      <a:fillRef idx="1">
+        <a:scrgbClr r="0" g="0" b="0"/>
+      </a:fillRef>
+      <a:effectRef idx="0">
+        <a:scrgbClr r="0" g="0" b="0"/>
+      </a:effectRef>
+      <a:fontRef idx="minor">
+        <a:schemeClr val="tx1"/>
+      </a:fontRef>
+    </dgm:style>
+  </dgm:styleLbl>
+  <dgm:styleLbl name="alignNode1">
+    <dgm:scene3d>
+      <a:camera prst="orthographicFront"/>
+      <a:lightRig rig="threePt" dir="t"/>
+    </dgm:scene3d>
+    <dgm:sp3d/>
+    <dgm:txPr/>
+    <dgm:style>
+      <a:lnRef idx="2">
+        <a:scrgbClr r="0" g="0" b="0"/>
+      </a:lnRef>
+      <a:fillRef idx="1">
+        <a:scrgbClr r="0" g="0" b="0"/>
+      </a:fillRef>
+      <a:effectRef idx="0">
+        <a:scrgbClr r="0" g="0" b="0"/>
+      </a:effectRef>
+      <a:fontRef idx="minor">
+        <a:schemeClr val="lt1"/>
+      </a:fontRef>
+    </dgm:style>
+  </dgm:styleLbl>
+  <dgm:styleLbl name="node1">
+    <dgm:scene3d>
+      <a:camera prst="orthographicFront"/>
+      <a:lightRig rig="threePt" dir="t"/>
+    </dgm:scene3d>
+    <dgm:sp3d/>
+    <dgm:txPr/>
+    <dgm:style>
+      <a:lnRef idx="2">
+        <a:scrgbClr r="0" g="0" b="0"/>
+      </a:lnRef>
+      <a:fillRef idx="1">
+        <a:scrgbClr r="0" g="0" b="0"/>
+      </a:fillRef>
+      <a:effectRef idx="0">
+        <a:scrgbClr r="0" g="0" b="0"/>
+      </a:effectRef>
+      <a:fontRef idx="minor">
+        <a:schemeClr val="lt1"/>
+      </a:fontRef>
+    </dgm:style>
+  </dgm:styleLbl>
+  <dgm:styleLbl name="node2">
+    <dgm:scene3d>
+      <a:camera prst="orthographicFront"/>
+      <a:lightRig rig="threePt" dir="t"/>
+    </dgm:scene3d>
+    <dgm:sp3d/>
+    <dgm:txPr/>
+    <dgm:style>
+      <a:lnRef idx="2">
+        <a:scrgbClr r="0" g="0" b="0"/>
+      </a:lnRef>
+      <a:fillRef idx="1">
+        <a:scrgbClr r="0" g="0" b="0"/>
+      </a:fillRef>
+      <a:effectRef idx="0">
+        <a:scrgbClr r="0" g="0" b="0"/>
+      </a:effectRef>
+      <a:fontRef idx="minor">
+        <a:schemeClr val="lt1"/>
+      </a:fontRef>
+    </dgm:style>
+  </dgm:styleLbl>
+  <dgm:styleLbl name="node3">
+    <dgm:scene3d>
+      <a:camera prst="orthographicFront"/>
+      <a:lightRig rig="threePt" dir="t"/>
+    </dgm:scene3d>
+    <dgm:sp3d/>
+    <dgm:txPr/>
+    <dgm:style>
+      <a:lnRef idx="2">
+        <a:scrgbClr r="0" g="0" b="0"/>
+      </a:lnRef>
+      <a:fillRef idx="1">
+        <a:scrgbClr r="0" g="0" b="0"/>
+      </a:fillRef>
+      <a:effectRef idx="0">
+        <a:scrgbClr r="0" g="0" b="0"/>
+      </a:effectRef>
+      <a:fontRef idx="minor">
+        <a:schemeClr val="lt1"/>
+      </a:fontRef>
+    </dgm:style>
+  </dgm:styleLbl>
+  <dgm:styleLbl name="node4">
+    <dgm:scene3d>
+      <a:camera prst="orthographicFront"/>
+      <a:lightRig rig="threePt" dir="t"/>
+    </dgm:scene3d>
+    <dgm:sp3d/>
+    <dgm:txPr/>
+    <dgm:style>
+      <a:lnRef idx="2">
+        <a:scrgbClr r="0" g="0" b="0"/>
+      </a:lnRef>
+      <a:fillRef idx="1">
+        <a:scrgbClr r="0" g="0" b="0"/>
+      </a:fillRef>
+      <a:effectRef idx="0">
+        <a:scrgbClr r="0" g="0" b="0"/>
+      </a:effectRef>
+      <a:fontRef idx="minor">
+        <a:schemeClr val="lt1"/>
+      </a:fontRef>
+    </dgm:style>
+  </dgm:styleLbl>
+  <dgm:styleLbl name="fgImgPlace1">
+    <dgm:scene3d>
+      <a:camera prst="orthographicFront"/>
+      <a:lightRig rig="threePt" dir="t"/>
+    </dgm:scene3d>
+    <dgm:sp3d/>
+    <dgm:txPr/>
+    <dgm:style>
+      <a:lnRef idx="2">
+        <a:scrgbClr r="0" g="0" b="0"/>
+      </a:lnRef>
+      <a:fillRef idx="1">
+        <a:scrgbClr r="0" g="0" b="0"/>
+      </a:fillRef>
+      <a:effectRef idx="0">
+        <a:scrgbClr r="0" g="0" b="0"/>
+      </a:effectRef>
+      <a:fontRef idx="minor"/>
+    </dgm:style>
+  </dgm:styleLbl>
+  <dgm:styleLbl name="alignImgPlace1">
+    <dgm:scene3d>
+      <a:camera prst="orthographicFront"/>
+      <a:lightRig rig="threePt" dir="t"/>
+    </dgm:scene3d>
+    <dgm:sp3d/>
+    <dgm:txPr/>
+    <dgm:style>
+      <a:lnRef idx="2">
+        <a:scrgbClr r="0" g="0" b="0"/>
+      </a:lnRef>
+      <a:fillRef idx="1">
+        <a:scrgbClr r="0" g="0" b="0"/>
+      </a:fillRef>
+      <a:effectRef idx="0">
+        <a:scrgbClr r="0" g="0" b="0"/>
+      </a:effectRef>
+      <a:fontRef idx="minor"/>
+    </dgm:style>
+  </dgm:styleLbl>
+  <dgm:styleLbl name="bgImgPlace1">
+    <dgm:scene3d>
+      <a:camera prst="orthographicFront"/>
+      <a:lightRig rig="threePt" dir="t"/>
+    </dgm:scene3d>
+    <dgm:sp3d/>
+    <dgm:txPr/>
+    <dgm:style>
+      <a:lnRef idx="2">
+        <a:scrgbClr r="0" g="0" b="0"/>
+      </a:lnRef>
+      <a:fillRef idx="1">
+        <a:scrgbClr r="0" g="0" b="0"/>
+      </a:fillRef>
+      <a:effectRef idx="0">
+        <a:scrgbClr r="0" g="0" b="0"/>
+      </a:effectRef>
+      <a:fontRef idx="minor"/>
+    </dgm:style>
+  </dgm:styleLbl>
+  <dgm:styleLbl name="sibTrans2D1">
+    <dgm:scene3d>
+      <a:camera prst="orthographicFront"/>
+      <a:lightRig rig="threePt" dir="t"/>
+    </dgm:scene3d>
+    <dgm:sp3d/>
+    <dgm:txPr/>
+    <dgm:style>
+      <a:lnRef idx="0">
+        <a:scrgbClr r="0" g="0" b="0"/>
+      </a:lnRef>
+      <a:fillRef idx="1">
+        <a:scrgbClr r="0" g="0" b="0"/>
+      </a:fillRef>
+      <a:effectRef idx="0">
+        <a:scrgbClr r="0" g="0" b="0"/>
+      </a:effectRef>
+      <a:fontRef idx="minor">
+        <a:schemeClr val="lt1"/>
+      </a:fontRef>
+    </dgm:style>
+  </dgm:styleLbl>
+  <dgm:styleLbl name="fgSibTrans2D1">
+    <dgm:scene3d>
+      <a:camera prst="orthographicFront"/>
+      <a:lightRig rig="threePt" dir="t"/>
+    </dgm:scene3d>
+    <dgm:sp3d/>
+    <dgm:txPr/>
+    <dgm:style>
+      <a:lnRef idx="0">
+        <a:scrgbClr r="0" g="0" b="0"/>
+      </a:lnRef>
+      <a:fillRef idx="1">
+        <a:scrgbClr r="0" g="0" b="0"/>
+      </a:fillRef>
+      <a:effectRef idx="0">
+        <a:scrgbClr r="0" g="0" b="0"/>
+      </a:effectRef>
+      <a:fontRef idx="minor">
+        <a:schemeClr val="lt1"/>
+      </a:fontRef>
+    </dgm:style>
+  </dgm:styleLbl>
+  <dgm:styleLbl name="bgSibTrans2D1">
+    <dgm:scene3d>
+      <a:camera prst="orthographicFront"/>
+      <a:lightRig rig="threePt" dir="t"/>
+    </dgm:scene3d>
+    <dgm:sp3d/>
+    <dgm:txPr/>
+    <dgm:style>
+      <a:lnRef idx="0">
+        <a:scrgbClr r="0" g="0" b="0"/>
+      </a:lnRef>
+      <a:fillRef idx="1">
+        <a:scrgbClr r="0" g="0" b="0"/>
+      </a:fillRef>
+      <a:effectRef idx="0">
+        <a:scrgbClr r="0" g="0" b="0"/>
+      </a:effectRef>
+      <a:fontRef idx="minor">
+        <a:schemeClr val="lt1"/>
+      </a:fontRef>
+    </dgm:style>
+  </dgm:styleLbl>
+  <dgm:styleLbl name="sibTrans1D1">
+    <dgm:scene3d>
+      <a:camera prst="orthographicFront"/>
+      <a:lightRig rig="threePt" dir="t"/>
+    </dgm:scene3d>
+    <dgm:sp3d/>
+    <dgm:txPr/>
+    <dgm:style>
+      <a:lnRef idx="1">
+        <a:scrgbClr r="0" g="0" b="0"/>
+      </a:lnRef>
+      <a:fillRef idx="0">
+        <a:scrgbClr r="0" g="0" b="0"/>
+      </a:fillRef>
+      <a:effectRef idx="0">
+        <a:scrgbClr r="0" g="0" b="0"/>
+      </a:effectRef>
+      <a:fontRef idx="minor"/>
+    </dgm:style>
+  </dgm:styleLbl>
+  <dgm:styleLbl name="callout">
+    <dgm:scene3d>
+      <a:camera prst="orthographicFront"/>
+      <a:lightRig rig="threePt" dir="t"/>
+    </dgm:scene3d>
+    <dgm:sp3d/>
+    <dgm:txPr/>
+    <dgm:style>
+      <a:lnRef idx="2">
+        <a:scrgbClr r="0" g="0" b="0"/>
+      </a:lnRef>
+      <a:fillRef idx="1">
+        <a:scrgbClr r="0" g="0" b="0"/>
+      </a:fillRef>
+      <a:effectRef idx="0">
+        <a:scrgbClr r="0" g="0" b="0"/>
+      </a:effectRef>
+      <a:fontRef idx="minor"/>
+    </dgm:style>
+  </dgm:styleLbl>
+  <dgm:styleLbl name="asst0">
+    <dgm:scene3d>
+      <a:camera prst="orthographicFront"/>
+      <a:lightRig rig="threePt" dir="t"/>
+    </dgm:scene3d>
+    <dgm:sp3d/>
+    <dgm:txPr/>
+    <dgm:style>
+      <a:lnRef idx="2">
+        <a:scrgbClr r="0" g="0" b="0"/>
+      </a:lnRef>
+      <a:fillRef idx="1">
+        <a:scrgbClr r="0" g="0" b="0"/>
+      </a:fillRef>
+      <a:effectRef idx="0">
+        <a:scrgbClr r="0" g="0" b="0"/>
+      </a:effectRef>
+      <a:fontRef idx="minor">
+        <a:schemeClr val="lt1"/>
+      </a:fontRef>
+    </dgm:style>
+  </dgm:styleLbl>
+  <dgm:styleLbl name="asst1">
+    <dgm:scene3d>
+      <a:camera prst="orthographicFront"/>
+      <a:lightRig rig="threePt" dir="t"/>
+    </dgm:scene3d>
+    <dgm:sp3d/>
+    <dgm:txPr/>
+    <dgm:style>
+      <a:lnRef idx="2">
+        <a:scrgbClr r="0" g="0" b="0"/>
+      </a:lnRef>
+      <a:fillRef idx="1">
+        <a:scrgbClr r="0" g="0" b="0"/>
+      </a:fillRef>
+      <a:effectRef idx="0">
+        <a:scrgbClr r="0" g="0" b="0"/>
+      </a:effectRef>
+      <a:fontRef idx="minor">
+        <a:schemeClr val="lt1"/>
+      </a:fontRef>
+    </dgm:style>
+  </dgm:styleLbl>
+  <dgm:styleLbl name="asst2">
+    <dgm:scene3d>
+      <a:camera prst="orthographicFront"/>
+      <a:lightRig rig="threePt" dir="t"/>
+    </dgm:scene3d>
+    <dgm:sp3d/>
+    <dgm:txPr/>
+    <dgm:style>
+      <a:lnRef idx="2">
+        <a:scrgbClr r="0" g="0" b="0"/>
+      </a:lnRef>
+      <a:fillRef idx="1">
+        <a:scrgbClr r="0" g="0" b="0"/>
+      </a:fillRef>
+      <a:effectRef idx="0">
+        <a:scrgbClr r="0" g="0" b="0"/>
+      </a:effectRef>
+      <a:fontRef idx="minor">
+        <a:schemeClr val="lt1"/>
+      </a:fontRef>
+    </dgm:style>
+  </dgm:styleLbl>
+  <dgm:styleLbl name="asst3">
+    <dgm:scene3d>
+      <a:camera prst="orthographicFront"/>
+      <a:lightRig rig="threePt" dir="t"/>
+    </dgm:scene3d>
+    <dgm:sp3d/>
+    <dgm:txPr/>
+    <dgm:style>
+      <a:lnRef idx="2">
+        <a:scrgbClr r="0" g="0" b="0"/>
+      </a:lnRef>
+      <a:fillRef idx="1">
+        <a:scrgbClr r="0" g="0" b="0"/>
+      </a:fillRef>
+      <a:effectRef idx="0">
+        <a:scrgbClr r="0" g="0" b="0"/>
+      </a:effectRef>
+      <a:fontRef idx="minor">
+        <a:schemeClr val="lt1"/>
+      </a:fontRef>
+    </dgm:style>
+  </dgm:styleLbl>
+  <dgm:styleLbl name="asst4">
+    <dgm:scene3d>
+      <a:camera prst="orthographicFront"/>
+      <a:lightRig rig="threePt" dir="t"/>
+    </dgm:scene3d>
+    <dgm:sp3d/>
+    <dgm:txPr/>
+    <dgm:style>
+      <a:lnRef idx="2">
+        <a:scrgbClr r="0" g="0" b="0"/>
+      </a:lnRef>
+      <a:fillRef idx="1">
+        <a:scrgbClr r="0" g="0" b="0"/>
+      </a:fillRef>
+      <a:effectRef idx="0">
+        <a:scrgbClr r="0" g="0" b="0"/>
+      </a:effectRef>
+      <a:fontRef idx="minor">
+        <a:schemeClr val="lt1"/>
+      </a:fontRef>
+    </dgm:style>
+  </dgm:styleLbl>
+  <dgm:styleLbl name="parChTrans2D1">
+    <dgm:scene3d>
+      <a:camera prst="orthographicFront"/>
+      <a:lightRig rig="threePt" dir="t"/>
+    </dgm:scene3d>
+    <dgm:sp3d/>
+    <dgm:txPr/>
+    <dgm:style>
+      <a:lnRef idx="2">
+        <a:scrgbClr r="0" g="0" b="0"/>
+      </a:lnRef>
+      <a:fillRef idx="1">
+        <a:scrgbClr r="0" g="0" b="0"/>
+      </a:fillRef>
+      <a:effectRef idx="0">
+        <a:scrgbClr r="0" g="0" b="0"/>
+      </a:effectRef>
+      <a:fontRef idx="minor">
+        <a:schemeClr val="lt1"/>
+      </a:fontRef>
+    </dgm:style>
+  </dgm:styleLbl>
+  <dgm:styleLbl name="parChTrans2D2">
+    <dgm:scene3d>
+      <a:camera prst="orthographicFront"/>
+      <a:lightRig rig="threePt" dir="t"/>
+    </dgm:scene3d>
+    <dgm:sp3d/>
+    <dgm:txPr/>
+    <dgm:style>
+      <a:lnRef idx="2">
+        <a:scrgbClr r="0" g="0" b="0"/>
+      </a:lnRef>
+      <a:fillRef idx="1">
+        <a:scrgbClr r="0" g="0" b="0"/>
+      </a:fillRef>
+      <a:effectRef idx="0">
+        <a:scrgbClr r="0" g="0" b="0"/>
+      </a:effectRef>
+      <a:fontRef idx="minor">
+        <a:schemeClr val="lt1"/>
+      </a:fontRef>
+    </dgm:style>
+  </dgm:styleLbl>
+  <dgm:styleLbl name="parChTrans2D3">
+    <dgm:scene3d>
+      <a:camera prst="orthographicFront"/>
+      <a:lightRig rig="threePt" dir="t"/>
+    </dgm:scene3d>
+    <dgm:sp3d/>
+    <dgm:txPr/>
+    <dgm:style>
+      <a:lnRef idx="2">
+        <a:scrgbClr r="0" g="0" b="0"/>
+      </a:lnRef>
+      <a:fillRef idx="1">
+        <a:scrgbClr r="0" g="0" b="0"/>
+      </a:fillRef>
+      <a:effectRef idx="0">
+        <a:scrgbClr r="0" g="0" b="0"/>
+      </a:effectRef>
+      <a:fontRef idx="minor">
+        <a:schemeClr val="lt1"/>
+      </a:fontRef>
+    </dgm:style>
+  </dgm:styleLbl>
+  <dgm:styleLbl name="parChTrans2D4">
+    <dgm:scene3d>
+      <a:camera prst="orthographicFront"/>
+      <a:lightRig rig="threePt" dir="t"/>
+    </dgm:scene3d>
+    <dgm:sp3d/>
+    <dgm:txPr/>
+    <dgm:style>
+      <a:lnRef idx="2">
+        <a:scrgbClr r="0" g="0" b="0"/>
+      </a:lnRef>
+      <a:fillRef idx="1">
+        <a:scrgbClr r="0" g="0" b="0"/>
+      </a:fillRef>
+      <a:effectRef idx="0">
+        <a:scrgbClr r="0" g="0" b="0"/>
+      </a:effectRef>
+      <a:fontRef idx="minor">
+        <a:schemeClr val="lt1"/>
+      </a:fontRef>
+    </dgm:style>
+  </dgm:styleLbl>
+  <dgm:styleLbl name="parChTrans1D1">
+    <dgm:scene3d>
+      <a:camera prst="orthographicFront"/>
+      <a:lightRig rig="threePt" dir="t"/>
+    </dgm:scene3d>
+    <dgm:sp3d/>
+    <dgm:txPr/>
+    <dgm:style>
+      <a:lnRef idx="2">
+        <a:scrgbClr r="0" g="0" b="0"/>
+      </a:lnRef>
+      <a:fillRef idx="0">
+        <a:scrgbClr r="0" g="0" b="0"/>
+      </a:fillRef>
+      <a:effectRef idx="0">
+        <a:scrgbClr r="0" g="0" b="0"/>
+      </a:effectRef>
+      <a:fontRef idx="minor"/>
+    </dgm:style>
+  </dgm:styleLbl>
+  <dgm:styleLbl name="parChTrans1D2">
+    <dgm:scene3d>
+      <a:camera prst="orthographicFront"/>
+      <a:lightRig rig="threePt" dir="t"/>
+    </dgm:scene3d>
+    <dgm:sp3d/>
+    <dgm:txPr/>
+    <dgm:style>
+      <a:lnRef idx="2">
+        <a:scrgbClr r="0" g="0" b="0"/>
+      </a:lnRef>
+      <a:fillRef idx="0">
+        <a:scrgbClr r="0" g="0" b="0"/>
+      </a:fillRef>
+      <a:effectRef idx="0">
+        <a:scrgbClr r="0" g="0" b="0"/>
+      </a:effectRef>
+      <a:fontRef idx="minor"/>
+    </dgm:style>
+  </dgm:styleLbl>
+  <dgm:styleLbl name="parChTrans1D3">
+    <dgm:scene3d>
+      <a:camera prst="orthographicFront"/>
+      <a:lightRig rig="threePt" dir="t"/>
+    </dgm:scene3d>
+    <dgm:sp3d/>
+    <dgm:txPr/>
+    <dgm:style>
+      <a:lnRef idx="2">
+        <a:scrgbClr r="0" g="0" b="0"/>
+      </a:lnRef>
+      <a:fillRef idx="0">
+        <a:scrgbClr r="0" g="0" b="0"/>
+      </a:fillRef>
+      <a:effectRef idx="0">
+        <a:scrgbClr r="0" g="0" b="0"/>
+      </a:effectRef>
+      <a:fontRef idx="minor"/>
+    </dgm:style>
+  </dgm:styleLbl>
+  <dgm:styleLbl name="parChTrans1D4">
+    <dgm:scene3d>
+      <a:camera prst="orthographicFront"/>
+      <a:lightRig rig="threePt" dir="t"/>
+    </dgm:scene3d>
+    <dgm:sp3d/>
+    <dgm:txPr/>
+    <dgm:style>
+      <a:lnRef idx="2">
+        <a:scrgbClr r="0" g="0" b="0"/>
+      </a:lnRef>
+      <a:fillRef idx="0">
+        <a:scrgbClr r="0" g="0" b="0"/>
+      </a:fillRef>
+      <a:effectRef idx="0">
+        <a:scrgbClr r="0" g="0" b="0"/>
+      </a:effectRef>
+      <a:fontRef idx="minor"/>
+    </dgm:style>
+  </dgm:styleLbl>
+  <dgm:styleLbl name="fgAcc1">
+    <dgm:scene3d>
+      <a:camera prst="orthographicFront"/>
+      <a:lightRig rig="threePt" dir="t"/>
+    </dgm:scene3d>
+    <dgm:sp3d/>
+    <dgm:txPr/>
+    <dgm:style>
+      <a:lnRef idx="2">
+        <a:scrgbClr r="0" g="0" b="0"/>
+      </a:lnRef>
+      <a:fillRef idx="1">
+        <a:scrgbClr r="0" g="0" b="0"/>
+      </a:fillRef>
+      <a:effectRef idx="0">
+        <a:scrgbClr r="0" g="0" b="0"/>
+      </a:effectRef>
+      <a:fontRef idx="minor"/>
+    </dgm:style>
+  </dgm:styleLbl>
+  <dgm:styleLbl name="conFgAcc1">
+    <dgm:scene3d>
+      <a:camera prst="orthographicFront"/>
+      <a:lightRig rig="threePt" dir="t"/>
+    </dgm:scene3d>
+    <dgm:sp3d/>
+    <dgm:txPr/>
+    <dgm:style>
+      <a:lnRef idx="2">
+        <a:scrgbClr r="0" g="0" b="0"/>
+      </a:lnRef>
+      <a:fillRef idx="1">
+        <a:scrgbClr r="0" g="0" b="0"/>
+      </a:fillRef>
+      <a:effectRef idx="0">
+        <a:scrgbClr r="0" g="0" b="0"/>
+      </a:effectRef>
+      <a:fontRef idx="minor"/>
+    </dgm:style>
+  </dgm:styleLbl>
+  <dgm:styleLbl name="alignAcc1">
+    <dgm:scene3d>
+      <a:camera prst="orthographicFront"/>
+      <a:lightRig rig="threePt" dir="t"/>
+    </dgm:scene3d>
+    <dgm:sp3d/>
+    <dgm:txPr/>
+    <dgm:style>
+      <a:lnRef idx="2">
+        <a:scrgbClr r="0" g="0" b="0"/>
+      </a:lnRef>
+      <a:fillRef idx="1">
+        <a:scrgbClr r="0" g="0" b="0"/>
+      </a:fillRef>
+      <a:effectRef idx="0">
+        <a:scrgbClr r="0" g="0" b="0"/>
+      </a:effectRef>
+      <a:fontRef idx="minor"/>
+    </dgm:style>
+  </dgm:styleLbl>
+  <dgm:styleLbl name="trAlignAcc1">
+    <dgm:scene3d>
+      <a:camera prst="orthographicFront"/>
+      <a:lightRig rig="threePt" dir="t"/>
+    </dgm:scene3d>
+    <dgm:sp3d/>
+    <dgm:txPr/>
+    <dgm:style>
+      <a:lnRef idx="1">
+        <a:scrgbClr r="0" g="0" b="0"/>
+      </a:lnRef>
+      <a:fillRef idx="1">
+        <a:scrgbClr r="0" g="0" b="0"/>
+      </a:fillRef>
+      <a:effectRef idx="0">
+        <a:scrgbClr r="0" g="0" b="0"/>
+      </a:effectRef>
+      <a:fontRef idx="minor"/>
+    </dgm:style>
+  </dgm:styleLbl>
+  <dgm:styleLbl name="bgAcc1">
+    <dgm:scene3d>
+      <a:camera prst="orthographicFront"/>
+      <a:lightRig rig="threePt" dir="t"/>
+    </dgm:scene3d>
+    <dgm:sp3d/>
+    <dgm:txPr/>
+    <dgm:style>
+      <a:lnRef idx="2">
+        <a:scrgbClr r="0" g="0" b="0"/>
+      </a:lnRef>
+      <a:fillRef idx="1">
+        <a:scrgbClr r="0" g="0" b="0"/>
+      </a:fillRef>
+      <a:effectRef idx="0">
+        <a:scrgbClr r="0" g="0" b="0"/>
+      </a:effectRef>
+      <a:fontRef idx="minor"/>
+    </dgm:style>
+  </dgm:styleLbl>
+  <dgm:styleLbl name="solidFgAcc1">
+    <dgm:scene3d>
+      <a:camera prst="orthographicFront"/>
+      <a:lightRig rig="threePt" dir="t"/>
+    </dgm:scene3d>
+    <dgm:sp3d/>
+    <dgm:txPr/>
+    <dgm:style>
+      <a:lnRef idx="2">
+        <a:scrgbClr r="0" g="0" b="0"/>
+      </a:lnRef>
+      <a:fillRef idx="1">
+        <a:scrgbClr r="0" g="0" b="0"/>
+      </a:fillRef>
+      <a:effectRef idx="0">
+        <a:scrgbClr r="0" g="0" b="0"/>
+      </a:effectRef>
+      <a:fontRef idx="minor"/>
+    </dgm:style>
+  </dgm:styleLbl>
+  <dgm:styleLbl name="solidAlignAcc1">
+    <dgm:scene3d>
+      <a:camera prst="orthographicFront"/>
+      <a:lightRig rig="threePt" dir="t"/>
+    </dgm:scene3d>
+    <dgm:sp3d/>
+    <dgm:txPr/>
+    <dgm:style>
+      <a:lnRef idx="2">
+        <a:scrgbClr r="0" g="0" b="0"/>
+      </a:lnRef>
+      <a:fillRef idx="1">
+        <a:scrgbClr r="0" g="0" b="0"/>
+      </a:fillRef>
+      <a:effectRef idx="0">
+        <a:scrgbClr r="0" g="0" b="0"/>
+      </a:effectRef>
+      <a:fontRef idx="minor"/>
+    </dgm:style>
+  </dgm:styleLbl>
+  <dgm:styleLbl name="solidBgAcc1">
+    <dgm:scene3d>
+      <a:camera prst="orthographicFront"/>
+      <a:lightRig rig="threePt" dir="t"/>
+    </dgm:scene3d>
+    <dgm:sp3d/>
+    <dgm:txPr/>
+    <dgm:style>
+      <a:lnRef idx="2">
+        <a:scrgbClr r="0" g="0" b="0"/>
+      </a:lnRef>
+      <a:fillRef idx="1">
+        <a:scrgbClr r="0" g="0" b="0"/>
+      </a:fillRef>
+      <a:effectRef idx="0">
+        <a:scrgbClr r="0" g="0" b="0"/>
+      </a:effectRef>
+      <a:fontRef idx="minor"/>
+    </dgm:style>
+  </dgm:styleLbl>
+  <dgm:styleLbl name="fgAccFollowNode1">
+    <dgm:scene3d>
+      <a:camera prst="orthographicFront"/>
+      <a:lightRig rig="threePt" dir="t"/>
+    </dgm:scene3d>
+    <dgm:sp3d/>
+    <dgm:txPr/>
+    <dgm:style>
+      <a:lnRef idx="2">
+        <a:scrgbClr r="0" g="0" b="0"/>
+      </a:lnRef>
+      <a:fillRef idx="1">
+        <a:scrgbClr r="0" g="0" b="0"/>
+      </a:fillRef>
+      <a:effectRef idx="0">
+        <a:scrgbClr r="0" g="0" b="0"/>
+      </a:effectRef>
+      <a:fontRef idx="minor"/>
+    </dgm:style>
+  </dgm:styleLbl>
+  <dgm:styleLbl name="alignAccFollowNode1">
+    <dgm:scene3d>
+      <a:camera prst="orthographicFront"/>
+      <a:lightRig rig="threePt" dir="t"/>
+    </dgm:scene3d>
+    <dgm:sp3d/>
+    <dgm:txPr/>
+    <dgm:style>
+      <a:lnRef idx="2">
+        <a:scrgbClr r="0" g="0" b="0"/>
+      </a:lnRef>
+      <a:fillRef idx="1">
+        <a:scrgbClr r="0" g="0" b="0"/>
+      </a:fillRef>
+      <a:effectRef idx="0">
+        <a:scrgbClr r="0" g="0" b="0"/>
+      </a:effectRef>
+      <a:fontRef idx="minor"/>
+    </dgm:style>
+  </dgm:styleLbl>
+  <dgm:styleLbl name="bgAccFollowNode1">
+    <dgm:scene3d>
+      <a:camera prst="orthographicFront"/>
+      <a:lightRig rig="threePt" dir="t"/>
+    </dgm:scene3d>
+    <dgm:sp3d/>
+    <dgm:txPr/>
+    <dgm:style>
+      <a:lnRef idx="2">
+        <a:scrgbClr r="0" g="0" b="0"/>
+      </a:lnRef>
+      <a:fillRef idx="1">
+        <a:scrgbClr r="0" g="0" b="0"/>
+      </a:fillRef>
+      <a:effectRef idx="0">
+        <a:scrgbClr r="0" g="0" b="0"/>
+      </a:effectRef>
+      <a:fontRef idx="minor"/>
+    </dgm:style>
+  </dgm:styleLbl>
+  <dgm:styleLbl name="fgAcc0">
+    <dgm:scene3d>
+      <a:camera prst="orthographicFront"/>
+      <a:lightRig rig="threePt" dir="t"/>
+    </dgm:scene3d>
+    <dgm:sp3d/>
+    <dgm:txPr/>
+    <dgm:style>
+      <a:lnRef idx="2">
+        <a:scrgbClr r="0" g="0" b="0"/>
+      </a:lnRef>
+      <a:fillRef idx="1">
+        <a:scrgbClr r="0" g="0" b="0"/>
+      </a:fillRef>
+      <a:effectRef idx="0">
+        <a:scrgbClr r="0" g="0" b="0"/>
+      </a:effectRef>
+      <a:fontRef idx="minor"/>
+    </dgm:style>
+  </dgm:styleLbl>
+  <dgm:styleLbl name="fgAcc2">
+    <dgm:scene3d>
+      <a:camera prst="orthographicFront"/>
+      <a:lightRig rig="threePt" dir="t"/>
+    </dgm:scene3d>
+    <dgm:sp3d/>
+    <dgm:txPr/>
+    <dgm:style>
+      <a:lnRef idx="2">
+        <a:scrgbClr r="0" g="0" b="0"/>
+      </a:lnRef>
+      <a:fillRef idx="1">
+        <a:scrgbClr r="0" g="0" b="0"/>
+      </a:fillRef>
+      <a:effectRef idx="0">
+        <a:scrgbClr r="0" g="0" b="0"/>
+      </a:effectRef>
+      <a:fontRef idx="minor"/>
+    </dgm:style>
+  </dgm:styleLbl>
+  <dgm:styleLbl name="fgAcc3">
+    <dgm:scene3d>
+      <a:camera prst="orthographicFront"/>
+      <a:lightRig rig="threePt" dir="t"/>
+    </dgm:scene3d>
+    <dgm:sp3d/>
+    <dgm:txPr/>
+    <dgm:style>
+      <a:lnRef idx="2">
+        <a:scrgbClr r="0" g="0" b="0"/>
+      </a:lnRef>
+      <a:fillRef idx="1">
+        <a:scrgbClr r="0" g="0" b="0"/>
+      </a:fillRef>
+      <a:effectRef idx="0">
+        <a:scrgbClr r="0" g="0" b="0"/>
+      </a:effectRef>
+      <a:fontRef idx="minor"/>
+    </dgm:style>
+  </dgm:styleLbl>
+  <dgm:styleLbl name="fgAcc4">
+    <dgm:scene3d>
+      <a:camera prst="orthographicFront"/>
+      <a:lightRig rig="threePt" dir="t"/>
+    </dgm:scene3d>
+    <dgm:sp3d/>
+    <dgm:txPr/>
+    <dgm:style>
+      <a:lnRef idx="2">
+        <a:scrgbClr r="0" g="0" b="0"/>
+      </a:lnRef>
+      <a:fillRef idx="1">
+        <a:scrgbClr r="0" g="0" b="0"/>
+      </a:fillRef>
+      <a:effectRef idx="0">
+        <a:scrgbClr r="0" g="0" b="0"/>
+      </a:effectRef>
+      <a:fontRef idx="minor"/>
+    </dgm:style>
+  </dgm:styleLbl>
+  <dgm:styleLbl name="bgShp">
+    <dgm:scene3d>
+      <a:camera prst="orthographicFront"/>
+      <a:lightRig rig="threePt" dir="t"/>
+    </dgm:scene3d>
+    <dgm:sp3d/>
+    <dgm:txPr/>
+    <dgm:style>
+      <a:lnRef idx="0">
+        <a:scrgbClr r="0" g="0" b="0"/>
+      </a:lnRef>
+      <a:fillRef idx="1">
+        <a:scrgbClr r="0" g="0" b="0"/>
+      </a:fillRef>
+      <a:effectRef idx="0">
+        <a:scrgbClr r="0" g="0" b="0"/>
+      </a:effectRef>
+      <a:fontRef idx="minor"/>
+    </dgm:style>
+  </dgm:styleLbl>
+  <dgm:styleLbl name="dkBgShp">
+    <dgm:scene3d>
+      <a:camera prst="orthographicFront"/>
+      <a:lightRig rig="threePt" dir="t"/>
+    </dgm:scene3d>
+    <dgm:sp3d/>
+    <dgm:txPr/>
+    <dgm:style>
+      <a:lnRef idx="0">
+        <a:scrgbClr r="0" g="0" b="0"/>
+      </a:lnRef>
+      <a:fillRef idx="1">
+        <a:scrgbClr r="0" g="0" b="0"/>
+      </a:fillRef>
+      <a:effectRef idx="0">
+        <a:scrgbClr r="0" g="0" b="0"/>
+      </a:effectRef>
+      <a:fontRef idx="minor"/>
+    </dgm:style>
+  </dgm:styleLbl>
+  <dgm:styleLbl name="trBgShp">
+    <dgm:scene3d>
+      <a:camera prst="orthographicFront"/>
+      <a:lightRig rig="threePt" dir="t"/>
+    </dgm:scene3d>
+    <dgm:sp3d/>
+    <dgm:txPr/>
+    <dgm:style>
+      <a:lnRef idx="0">
+        <a:scrgbClr r="0" g="0" b="0"/>
+      </a:lnRef>
+      <a:fillRef idx="1">
+        <a:scrgbClr r="0" g="0" b="0"/>
+      </a:fillRef>
+      <a:effectRef idx="0">
+        <a:scrgbClr r="0" g="0" b="0"/>
+      </a:effectRef>
+      <a:fontRef idx="minor"/>
+    </dgm:style>
+  </dgm:styleLbl>
+  <dgm:styleLbl name="fgShp">
+    <dgm:scene3d>
+      <a:camera prst="orthographicFront"/>
+      <a:lightRig rig="threePt" dir="t"/>
+    </dgm:scene3d>
+    <dgm:sp3d/>
+    <dgm:txPr/>
+    <dgm:style>
+      <a:lnRef idx="2">
+        <a:scrgbClr r="0" g="0" b="0"/>
+      </a:lnRef>
+      <a:fillRef idx="1">
+        <a:scrgbClr r="0" g="0" b="0"/>
+      </a:fillRef>
+      <a:effectRef idx="0">
+        <a:scrgbClr r="0" g="0" b="0"/>
+      </a:effectRef>
+      <a:fontRef idx="minor"/>
+    </dgm:style>
+  </dgm:styleLbl>
+  <dgm:styleLbl name="revTx">
+    <dgm:scene3d>
+      <a:camera prst="orthographicFront"/>
+      <a:lightRig rig="threePt" dir="t"/>
+    </dgm:scene3d>
+    <dgm:sp3d/>
+    <dgm:txPr/>
+    <dgm:style>
+      <a:lnRef idx="0">
+        <a:scrgbClr r="0" g="0" b="0"/>
+      </a:lnRef>
+      <a:fillRef idx="0">
+        <a:scrgbClr r="0" g="0" b="0"/>
+      </a:fillRef>
+      <a:effectRef idx="0">
+        <a:scrgbClr r="0" g="0" b="0"/>
+      </a:effectRef>
+      <a:fontRef idx="minor"/>
+    </dgm:style>
+  </dgm:styleLbl>
+</dgm:styleDef>
 </file>
 
 <file path=ppt/notesMasters/notesMaster1.xml><?xml version="1.0" encoding="utf-8"?>
@@ -3940,22 +6886,110 @@
           </a:p>
         </p:txBody>
       </p:sp>
-      <p:sp>
-        <p:nvSpPr>
-          <p:cNvPr id="3" name="Marcador de Posição de Conteúdo 2"/>
-          <p:cNvSpPr>
-            <a:spLocks noGrp="1"/>
-          </p:cNvSpPr>
+      <p:graphicFrame>
+        <p:nvGraphicFramePr>
+          <p:cNvPr id="8" name="Marcador de Posição de Conteúdo 7">
+            <a:extLst>
+              <a:ext uri="{FF2B5EF4-FFF2-40B4-BE49-F238E27FC236}">
+                <a16:creationId xmlns:a16="http://schemas.microsoft.com/office/drawing/2014/main" id="{E1D6AAC6-40CE-B645-B190-D1F0C112918B}"/>
+              </a:ext>
+            </a:extLst>
+          </p:cNvPr>
+          <p:cNvGraphicFramePr>
+            <a:graphicFrameLocks noGrp="1"/>
+          </p:cNvGraphicFramePr>
           <p:nvPr>
             <p:ph idx="1"/>
-          </p:nvPr>
-        </p:nvSpPr>
-        <p:spPr/>
-        <p:txBody>
-          <a:bodyPr/>
-          <a:lstStyle/>
-          <a:p>
-            <a:endParaRPr lang="pt-PT" dirty="0"/>
+            <p:extLst>
+              <p:ext uri="{D42A27DB-BD31-4B8C-83A1-F6EECF244321}">
+                <p14:modId xmlns:p14="http://schemas.microsoft.com/office/powerpoint/2010/main" val="2975832063"/>
+              </p:ext>
+            </p:extLst>
+          </p:nvPr>
+        </p:nvGraphicFramePr>
+        <p:xfrm>
+          <a:off x="1143000" y="2057400"/>
+          <a:ext cx="9872663" cy="4038600"/>
+        </p:xfrm>
+        <a:graphic>
+          <a:graphicData uri="http://schemas.openxmlformats.org/drawingml/2006/diagram">
+            <dgm:relIds xmlns:dgm="http://schemas.openxmlformats.org/drawingml/2006/diagram" xmlns:r="http://schemas.openxmlformats.org/officeDocument/2006/relationships" r:dm="rId2" r:lo="rId3" r:qs="rId4" r:cs="rId5"/>
+          </a:graphicData>
+        </a:graphic>
+      </p:graphicFrame>
+      <p:sp>
+        <p:nvSpPr>
+          <p:cNvPr id="10" name="Título 1">
+            <a:extLst>
+              <a:ext uri="{FF2B5EF4-FFF2-40B4-BE49-F238E27FC236}">
+                <a16:creationId xmlns:a16="http://schemas.microsoft.com/office/drawing/2014/main" id="{87B6FAAB-F413-EB4A-934A-5010FAA67E7C}"/>
+              </a:ext>
+            </a:extLst>
+          </p:cNvPr>
+          <p:cNvSpPr txBox="1">
+            <a:spLocks/>
+          </p:cNvSpPr>
+          <p:nvPr/>
+        </p:nvSpPr>
+        <p:spPr>
+          <a:xfrm>
+            <a:off x="1143000" y="1379220"/>
+            <a:ext cx="9875520" cy="1356360"/>
+          </a:xfrm>
+          <a:prstGeom prst="rect">
+            <a:avLst/>
+          </a:prstGeom>
+        </p:spPr>
+        <p:txBody>
+          <a:bodyPr vert="horz" lIns="91440" tIns="45720" rIns="91440" bIns="45720" rtlCol="0" anchor="ctr">
+            <a:normAutofit/>
+          </a:bodyPr>
+          <a:lstStyle>
+            <a:lvl1pPr algn="l" defTabSz="914400" rtl="0" eaLnBrk="1" latinLnBrk="0" hangingPunct="1">
+              <a:lnSpc>
+                <a:spcPct val="90000"/>
+              </a:lnSpc>
+              <a:spcBef>
+                <a:spcPct val="0"/>
+              </a:spcBef>
+              <a:buNone/>
+              <a:defRPr sz="4400" kern="1200">
+                <a:solidFill>
+                  <a:schemeClr val="accent1"/>
+                </a:solidFill>
+                <a:latin typeface="+mj-lt"/>
+                <a:ea typeface="+mj-ea"/>
+                <a:cs typeface="+mj-cs"/>
+              </a:defRPr>
+            </a:lvl1pPr>
+          </a:lstStyle>
+          <a:p>
+            <a:pPr algn="ctr"/>
+            <a:r>
+              <a:rPr lang="pt-PT" b="1" dirty="0">
+                <a:ln w="12700" cmpd="sng">
+                  <a:solidFill>
+                    <a:srgbClr val="C00000"/>
+                  </a:solidFill>
+                  <a:prstDash val="solid"/>
+                </a:ln>
+                <a:solidFill>
+                  <a:schemeClr val="accent6">
+                    <a:lumMod val="20000"/>
+                    <a:lumOff val="80000"/>
+                  </a:schemeClr>
+                </a:solidFill>
+              </a:rPr>
+              <a:t>TIMELINE</a:t>
+            </a:r>
+            <a:endParaRPr lang="pt-PT" dirty="0">
+              <a:solidFill>
+                <a:schemeClr val="accent6">
+                  <a:lumMod val="20000"/>
+                  <a:lumOff val="80000"/>
+                </a:schemeClr>
+              </a:solidFill>
+            </a:endParaRPr>
           </a:p>
         </p:txBody>
       </p:sp>

</xml_diff>

<commit_message>
Update Apresentacao Meta 1 - BD.pptx
</commit_message>
<xml_diff>
--- a/Meta1/Apresentacao Meta 1 - BD.pptx
+++ b/Meta1/Apresentacao Meta 1 - BD.pptx
@@ -1112,6 +1112,13 @@
         </dgm:presLayoutVars>
       </dgm:prSet>
       <dgm:spPr/>
+      <dgm:t>
+        <a:bodyPr/>
+        <a:lstStyle/>
+        <a:p>
+          <a:endParaRPr lang="pt-PT"/>
+        </a:p>
+      </dgm:t>
     </dgm:pt>
     <dgm:pt modelId="{B977E860-A9F3-0F4E-9A01-D289138904F2}" type="pres">
       <dgm:prSet presAssocID="{47B59E53-B1FD-1C4B-83D5-34FCBDF28657}" presName="circleA" presStyleLbl="node1" presStyleIdx="0" presStyleCnt="4"/>
@@ -1136,6 +1143,13 @@
         </dgm:presLayoutVars>
       </dgm:prSet>
       <dgm:spPr/>
+      <dgm:t>
+        <a:bodyPr/>
+        <a:lstStyle/>
+        <a:p>
+          <a:endParaRPr lang="pt-PT"/>
+        </a:p>
+      </dgm:t>
     </dgm:pt>
     <dgm:pt modelId="{49DD4BC2-EC51-E245-B12B-D3407DB6E412}" type="pres">
       <dgm:prSet presAssocID="{F3B7919C-A10C-BB40-95EE-F34AF80342F3}" presName="circleB" presStyleLbl="node1" presStyleIdx="1" presStyleCnt="4"/>
@@ -1160,6 +1174,13 @@
         </dgm:presLayoutVars>
       </dgm:prSet>
       <dgm:spPr/>
+      <dgm:t>
+        <a:bodyPr/>
+        <a:lstStyle/>
+        <a:p>
+          <a:endParaRPr lang="pt-PT"/>
+        </a:p>
+      </dgm:t>
     </dgm:pt>
     <dgm:pt modelId="{AB1B50C7-24DB-304D-9711-DC3BB7E5D58A}" type="pres">
       <dgm:prSet presAssocID="{7B98E45C-BBE0-A94D-B0FD-C40760C3894C}" presName="circleA" presStyleLbl="node1" presStyleIdx="2" presStyleCnt="4"/>
@@ -1184,6 +1205,13 @@
         </dgm:presLayoutVars>
       </dgm:prSet>
       <dgm:spPr/>
+      <dgm:t>
+        <a:bodyPr/>
+        <a:lstStyle/>
+        <a:p>
+          <a:endParaRPr lang="pt-PT"/>
+        </a:p>
+      </dgm:t>
     </dgm:pt>
     <dgm:pt modelId="{578F4F22-F8FC-044F-8CBD-14BFAF2AD66B}" type="pres">
       <dgm:prSet presAssocID="{DD90320B-E777-5144-8B49-05822BBE8A37}" presName="circleB" presStyleLbl="node1" presStyleIdx="3" presStyleCnt="4"/>
@@ -1195,15 +1223,15 @@
     </dgm:pt>
   </dgm:ptLst>
   <dgm:cxnLst>
-    <dgm:cxn modelId="{DAA68107-7B49-D04F-983B-6BDF78E2F14C}" srcId="{19867A28-8E0A-174F-8602-3D4942F76EE2}" destId="{7B98E45C-BBE0-A94D-B0FD-C40760C3894C}" srcOrd="2" destOrd="0" parTransId="{D2E01111-9666-344D-AB09-77514638DE83}" sibTransId="{D596D633-C4F3-1F4B-BA01-A7086FB0282A}"/>
-    <dgm:cxn modelId="{29087308-82C5-4D40-BB0D-D2E3A9CE7EBE}" type="presOf" srcId="{F3B7919C-A10C-BB40-95EE-F34AF80342F3}" destId="{DCC0251D-27A9-914E-AB70-BA29048F980E}" srcOrd="0" destOrd="0" presId="urn:microsoft.com/office/officeart/2005/8/layout/hProcess11"/>
-    <dgm:cxn modelId="{530EAE17-7A24-B245-97B1-E38A9C217ACB}" type="presOf" srcId="{47B59E53-B1FD-1C4B-83D5-34FCBDF28657}" destId="{CBF32A05-7824-5045-B11B-78C8ABB0D375}" srcOrd="0" destOrd="0" presId="urn:microsoft.com/office/officeart/2005/8/layout/hProcess11"/>
-    <dgm:cxn modelId="{43C1AC48-46A3-D644-BBFB-F13CD05F432F}" type="presOf" srcId="{DD90320B-E777-5144-8B49-05822BBE8A37}" destId="{6C8C2D3E-E8E9-E647-A201-E46DC7B58592}" srcOrd="0" destOrd="0" presId="urn:microsoft.com/office/officeart/2005/8/layout/hProcess11"/>
-    <dgm:cxn modelId="{ED6DDA6B-EA81-F54E-AB5F-B1D1911371B2}" srcId="{19867A28-8E0A-174F-8602-3D4942F76EE2}" destId="{F3B7919C-A10C-BB40-95EE-F34AF80342F3}" srcOrd="1" destOrd="0" parTransId="{FA452B69-6BF6-8149-9426-9A746E887F8B}" sibTransId="{64A4C6A3-E6C7-094B-A8A5-68FD85B34371}"/>
     <dgm:cxn modelId="{5B7BD27D-CF44-B246-BD32-35C3D3E26205}" srcId="{19867A28-8E0A-174F-8602-3D4942F76EE2}" destId="{47B59E53-B1FD-1C4B-83D5-34FCBDF28657}" srcOrd="0" destOrd="0" parTransId="{F7EC4134-5CEB-DA4E-87FF-E44FBCC0AA56}" sibTransId="{384CA9E4-ADE3-3F4C-93EF-86C009110F7B}"/>
     <dgm:cxn modelId="{661CECE3-97E2-AF4E-A844-BC485921CC6F}" type="presOf" srcId="{7B98E45C-BBE0-A94D-B0FD-C40760C3894C}" destId="{EFE97A2E-F366-A44A-9C26-1FC423BD57FB}" srcOrd="0" destOrd="0" presId="urn:microsoft.com/office/officeart/2005/8/layout/hProcess11"/>
+    <dgm:cxn modelId="{DB4041F5-16EF-CF42-BA7A-63C833BC5CFE}" srcId="{19867A28-8E0A-174F-8602-3D4942F76EE2}" destId="{DD90320B-E777-5144-8B49-05822BBE8A37}" srcOrd="3" destOrd="0" parTransId="{A18DEF8F-6C69-EA4B-B386-9F3214DD2A1A}" sibTransId="{3A13A593-A01C-3C48-AABB-B876F2D1DBC6}"/>
+    <dgm:cxn modelId="{DAA68107-7B49-D04F-983B-6BDF78E2F14C}" srcId="{19867A28-8E0A-174F-8602-3D4942F76EE2}" destId="{7B98E45C-BBE0-A94D-B0FD-C40760C3894C}" srcOrd="2" destOrd="0" parTransId="{D2E01111-9666-344D-AB09-77514638DE83}" sibTransId="{D596D633-C4F3-1F4B-BA01-A7086FB0282A}"/>
+    <dgm:cxn modelId="{43C1AC48-46A3-D644-BBFB-F13CD05F432F}" type="presOf" srcId="{DD90320B-E777-5144-8B49-05822BBE8A37}" destId="{6C8C2D3E-E8E9-E647-A201-E46DC7B58592}" srcOrd="0" destOrd="0" presId="urn:microsoft.com/office/officeart/2005/8/layout/hProcess11"/>
     <dgm:cxn modelId="{D22660E4-7F87-C445-BC58-8BD36585B959}" type="presOf" srcId="{19867A28-8E0A-174F-8602-3D4942F76EE2}" destId="{21A10D2B-B8AA-B44B-A66D-9A35C7678F26}" srcOrd="0" destOrd="0" presId="urn:microsoft.com/office/officeart/2005/8/layout/hProcess11"/>
-    <dgm:cxn modelId="{DB4041F5-16EF-CF42-BA7A-63C833BC5CFE}" srcId="{19867A28-8E0A-174F-8602-3D4942F76EE2}" destId="{DD90320B-E777-5144-8B49-05822BBE8A37}" srcOrd="3" destOrd="0" parTransId="{A18DEF8F-6C69-EA4B-B386-9F3214DD2A1A}" sibTransId="{3A13A593-A01C-3C48-AABB-B876F2D1DBC6}"/>
+    <dgm:cxn modelId="{530EAE17-7A24-B245-97B1-E38A9C217ACB}" type="presOf" srcId="{47B59E53-B1FD-1C4B-83D5-34FCBDF28657}" destId="{CBF32A05-7824-5045-B11B-78C8ABB0D375}" srcOrd="0" destOrd="0" presId="urn:microsoft.com/office/officeart/2005/8/layout/hProcess11"/>
+    <dgm:cxn modelId="{ED6DDA6B-EA81-F54E-AB5F-B1D1911371B2}" srcId="{19867A28-8E0A-174F-8602-3D4942F76EE2}" destId="{F3B7919C-A10C-BB40-95EE-F34AF80342F3}" srcOrd="1" destOrd="0" parTransId="{FA452B69-6BF6-8149-9426-9A746E887F8B}" sibTransId="{64A4C6A3-E6C7-094B-A8A5-68FD85B34371}"/>
+    <dgm:cxn modelId="{29087308-82C5-4D40-BB0D-D2E3A9CE7EBE}" type="presOf" srcId="{F3B7919C-A10C-BB40-95EE-F34AF80342F3}" destId="{DCC0251D-27A9-914E-AB70-BA29048F980E}" srcOrd="0" destOrd="0" presId="urn:microsoft.com/office/officeart/2005/8/layout/hProcess11"/>
     <dgm:cxn modelId="{94C8BB35-3A08-3843-BD6B-8DECA3492383}" type="presParOf" srcId="{21A10D2B-B8AA-B44B-A66D-9A35C7678F26}" destId="{B9A7CFC7-2578-9D41-9176-3E35873E03CC}" srcOrd="0" destOrd="0" presId="urn:microsoft.com/office/officeart/2005/8/layout/hProcess11"/>
     <dgm:cxn modelId="{C96BE6C1-7146-7248-AF90-3FAD205F27F4}" type="presParOf" srcId="{21A10D2B-B8AA-B44B-A66D-9A35C7678F26}" destId="{508077A3-DABC-F448-BE0A-E854596DB81E}" srcOrd="1" destOrd="0" presId="urn:microsoft.com/office/officeart/2005/8/layout/hProcess11"/>
     <dgm:cxn modelId="{2B79EDAE-BC10-054E-ADFA-C9E09A3E67D0}" type="presParOf" srcId="{508077A3-DABC-F448-BE0A-E854596DB81E}" destId="{68977E76-9E52-BC4F-AC35-F03836558771}" srcOrd="0" destOrd="0" presId="urn:microsoft.com/office/officeart/2005/8/layout/hProcess11"/>
@@ -1321,7 +1349,7 @@
         </a:bodyPr>
         <a:lstStyle/>
         <a:p>
-          <a:pPr marL="0" lvl="0" indent="0" algn="ctr" defTabSz="844550">
+          <a:pPr lvl="0" algn="ctr" defTabSz="844550">
             <a:lnSpc>
               <a:spcPct val="90000"/>
             </a:lnSpc>
@@ -1331,7 +1359,6 @@
             <a:spcAft>
               <a:spcPct val="35000"/>
             </a:spcAft>
-            <a:buNone/>
           </a:pPr>
           <a:r>
             <a:rPr lang="pt-PT" sz="1900" kern="1200" dirty="0"/>
@@ -1339,7 +1366,7 @@
           </a:r>
         </a:p>
         <a:p>
-          <a:pPr marL="0" lvl="0" indent="0" algn="ctr" defTabSz="844550">
+          <a:pPr lvl="0" algn="ctr" defTabSz="844550">
             <a:lnSpc>
               <a:spcPct val="90000"/>
             </a:lnSpc>
@@ -1349,7 +1376,6 @@
             <a:spcAft>
               <a:spcPct val="35000"/>
             </a:spcAft>
-            <a:buNone/>
           </a:pPr>
           <a:r>
             <a:rPr lang="pt-PT" sz="1100" b="0" kern="1200" dirty="0"/>
@@ -1448,7 +1474,7 @@
         </a:bodyPr>
         <a:lstStyle/>
         <a:p>
-          <a:pPr marL="0" lvl="0" indent="0" algn="ctr" defTabSz="488950">
+          <a:pPr lvl="0" algn="ctr" defTabSz="488950">
             <a:lnSpc>
               <a:spcPct val="90000"/>
             </a:lnSpc>
@@ -1458,7 +1484,6 @@
             <a:spcAft>
               <a:spcPct val="35000"/>
             </a:spcAft>
-            <a:buNone/>
           </a:pPr>
           <a:r>
             <a:rPr lang="pt-PT" sz="1100" b="0" kern="1200" dirty="0"/>
@@ -1467,7 +1492,7 @@
           <a:endParaRPr lang="pt-PT" sz="1100" kern="1200" dirty="0"/>
         </a:p>
         <a:p>
-          <a:pPr marL="0" lvl="0" indent="0" algn="ctr" defTabSz="488950">
+          <a:pPr lvl="0" algn="ctr" defTabSz="488950">
             <a:lnSpc>
               <a:spcPct val="90000"/>
             </a:lnSpc>
@@ -1477,7 +1502,6 @@
             <a:spcAft>
               <a:spcPct val="35000"/>
             </a:spcAft>
-            <a:buNone/>
           </a:pPr>
           <a:r>
             <a:rPr lang="pt-PT" sz="1900" kern="1200" dirty="0"/>
@@ -1576,7 +1600,7 @@
         </a:bodyPr>
         <a:lstStyle/>
         <a:p>
-          <a:pPr marL="0" lvl="0" indent="0" algn="ctr" defTabSz="844550">
+          <a:pPr lvl="0" algn="ctr" defTabSz="844550">
             <a:lnSpc>
               <a:spcPct val="90000"/>
             </a:lnSpc>
@@ -1586,7 +1610,6 @@
             <a:spcAft>
               <a:spcPct val="35000"/>
             </a:spcAft>
-            <a:buNone/>
           </a:pPr>
           <a:r>
             <a:rPr lang="pt-PT" sz="1900" kern="1200" dirty="0"/>
@@ -1594,7 +1617,7 @@
           </a:r>
         </a:p>
         <a:p>
-          <a:pPr marL="0" lvl="0" indent="0" algn="ctr" defTabSz="844550">
+          <a:pPr lvl="0" algn="ctr" defTabSz="844550">
             <a:lnSpc>
               <a:spcPct val="90000"/>
             </a:lnSpc>
@@ -1604,7 +1627,6 @@
             <a:spcAft>
               <a:spcPct val="35000"/>
             </a:spcAft>
-            <a:buNone/>
           </a:pPr>
           <a:r>
             <a:rPr lang="pt-PT" sz="1100" b="0" kern="1200" dirty="0"/>
@@ -1704,7 +1726,7 @@
         </a:bodyPr>
         <a:lstStyle/>
         <a:p>
-          <a:pPr marL="0" lvl="0" indent="0" algn="ctr" defTabSz="488950">
+          <a:pPr lvl="0" algn="ctr" defTabSz="488950">
             <a:lnSpc>
               <a:spcPct val="90000"/>
             </a:lnSpc>
@@ -1714,7 +1736,6 @@
             <a:spcAft>
               <a:spcPct val="35000"/>
             </a:spcAft>
-            <a:buNone/>
           </a:pPr>
           <a:r>
             <a:rPr lang="pt-PT" sz="1100" b="0" kern="1200" dirty="0"/>
@@ -1723,7 +1744,7 @@
           <a:endParaRPr lang="pt-PT" sz="1100" kern="1200" dirty="0"/>
         </a:p>
         <a:p>
-          <a:pPr marL="0" lvl="0" indent="0" algn="ctr" defTabSz="488950">
+          <a:pPr lvl="0" algn="ctr" defTabSz="488950">
             <a:lnSpc>
               <a:spcPct val="90000"/>
             </a:lnSpc>
@@ -1733,7 +1754,6 @@
             <a:spcAft>
               <a:spcPct val="35000"/>
             </a:spcAft>
-            <a:buNone/>
           </a:pPr>
           <a:r>
             <a:rPr lang="pt-PT" sz="1800" kern="1200" dirty="0"/>
@@ -1741,7 +1761,7 @@
           </a:r>
         </a:p>
         <a:p>
-          <a:pPr marL="0" lvl="0" indent="0" algn="ctr" defTabSz="488950">
+          <a:pPr lvl="0" algn="ctr" defTabSz="488950">
             <a:lnSpc>
               <a:spcPct val="90000"/>
             </a:lnSpc>
@@ -1751,7 +1771,6 @@
             <a:spcAft>
               <a:spcPct val="35000"/>
             </a:spcAft>
-            <a:buNone/>
           </a:pPr>
           <a:r>
             <a:rPr lang="pt-PT" sz="1400" kern="1200" dirty="0"/>
@@ -1759,7 +1778,7 @@
           </a:r>
         </a:p>
         <a:p>
-          <a:pPr marL="0" lvl="0" indent="0" algn="ctr" defTabSz="488950">
+          <a:pPr lvl="0" algn="ctr" defTabSz="488950">
             <a:lnSpc>
               <a:spcPct val="90000"/>
             </a:lnSpc>
@@ -1769,7 +1788,6 @@
             <a:spcAft>
               <a:spcPct val="35000"/>
             </a:spcAft>
-            <a:buNone/>
           </a:pPr>
           <a:r>
             <a:rPr lang="pt-PT" sz="1400" kern="1200" dirty="0"/>
@@ -1777,7 +1795,7 @@
           </a:r>
         </a:p>
         <a:p>
-          <a:pPr marL="0" lvl="0" indent="0" algn="ctr" defTabSz="488950">
+          <a:pPr lvl="0" algn="ctr" defTabSz="488950">
             <a:lnSpc>
               <a:spcPct val="90000"/>
             </a:lnSpc>
@@ -1787,7 +1805,6 @@
             <a:spcAft>
               <a:spcPct val="35000"/>
             </a:spcAft>
-            <a:buNone/>
           </a:pPr>
           <a:r>
             <a:rPr lang="pt-PT" sz="1400" kern="1200" dirty="0"/>
@@ -3241,7 +3258,7 @@
           <a:p>
             <a:fld id="{1303AD5F-FA35-4031-8101-42486EFA4347}" type="datetimeFigureOut">
               <a:rPr lang="pt-PT" smtClean="0"/>
-              <a:t>12/04/2021</a:t>
+              <a:t>13/04/2021</a:t>
             </a:fld>
             <a:endParaRPr lang="pt-PT" dirty="0"/>
           </a:p>
@@ -3719,7 +3736,7 @@
           <a:p>
             <a:fld id="{471B0E21-55E2-436E-8072-0F7F3758AA5E}" type="datetimeFigureOut">
               <a:rPr lang="pt-PT" smtClean="0"/>
-              <a:t>12/04/2021</a:t>
+              <a:t>13/04/2021</a:t>
             </a:fld>
             <a:endParaRPr lang="pt-PT" dirty="0"/>
           </a:p>
@@ -3940,7 +3957,7 @@
           <a:p>
             <a:fld id="{471B0E21-55E2-436E-8072-0F7F3758AA5E}" type="datetimeFigureOut">
               <a:rPr lang="pt-PT" smtClean="0"/>
-              <a:t>12/04/2021</a:t>
+              <a:t>13/04/2021</a:t>
             </a:fld>
             <a:endParaRPr lang="pt-PT" dirty="0"/>
           </a:p>
@@ -4120,7 +4137,7 @@
           <a:p>
             <a:fld id="{471B0E21-55E2-436E-8072-0F7F3758AA5E}" type="datetimeFigureOut">
               <a:rPr lang="pt-PT" smtClean="0"/>
-              <a:t>12/04/2021</a:t>
+              <a:t>13/04/2021</a:t>
             </a:fld>
             <a:endParaRPr lang="pt-PT" dirty="0"/>
           </a:p>
@@ -4290,7 +4307,7 @@
           <a:p>
             <a:fld id="{471B0E21-55E2-436E-8072-0F7F3758AA5E}" type="datetimeFigureOut">
               <a:rPr lang="pt-PT" smtClean="0"/>
-              <a:t>12/04/2021</a:t>
+              <a:t>13/04/2021</a:t>
             </a:fld>
             <a:endParaRPr lang="pt-PT" dirty="0"/>
           </a:p>
@@ -4564,7 +4581,7 @@
           <a:p>
             <a:fld id="{471B0E21-55E2-436E-8072-0F7F3758AA5E}" type="datetimeFigureOut">
               <a:rPr lang="pt-PT" smtClean="0"/>
-              <a:t>12/04/2021</a:t>
+              <a:t>13/04/2021</a:t>
             </a:fld>
             <a:endParaRPr lang="pt-PT" dirty="0"/>
           </a:p>
@@ -4887,7 +4904,7 @@
           <a:p>
             <a:fld id="{471B0E21-55E2-436E-8072-0F7F3758AA5E}" type="datetimeFigureOut">
               <a:rPr lang="pt-PT" smtClean="0"/>
-              <a:t>12/04/2021</a:t>
+              <a:t>13/04/2021</a:t>
             </a:fld>
             <a:endParaRPr lang="pt-PT" dirty="0"/>
           </a:p>
@@ -5311,7 +5328,7 @@
           <a:p>
             <a:fld id="{471B0E21-55E2-436E-8072-0F7F3758AA5E}" type="datetimeFigureOut">
               <a:rPr lang="pt-PT" smtClean="0"/>
-              <a:t>12/04/2021</a:t>
+              <a:t>13/04/2021</a:t>
             </a:fld>
             <a:endParaRPr lang="pt-PT" dirty="0"/>
           </a:p>
@@ -5429,7 +5446,7 @@
           <a:p>
             <a:fld id="{471B0E21-55E2-436E-8072-0F7F3758AA5E}" type="datetimeFigureOut">
               <a:rPr lang="pt-PT" smtClean="0"/>
-              <a:t>12/04/2021</a:t>
+              <a:t>13/04/2021</a:t>
             </a:fld>
             <a:endParaRPr lang="pt-PT" dirty="0"/>
           </a:p>
@@ -5524,7 +5541,7 @@
           <a:p>
             <a:fld id="{471B0E21-55E2-436E-8072-0F7F3758AA5E}" type="datetimeFigureOut">
               <a:rPr lang="pt-PT" smtClean="0"/>
-              <a:t>12/04/2021</a:t>
+              <a:t>13/04/2021</a:t>
             </a:fld>
             <a:endParaRPr lang="pt-PT" dirty="0"/>
           </a:p>
@@ -5814,7 +5831,7 @@
           <a:p>
             <a:fld id="{471B0E21-55E2-436E-8072-0F7F3758AA5E}" type="datetimeFigureOut">
               <a:rPr lang="pt-PT" smtClean="0"/>
-              <a:t>12/04/2021</a:t>
+              <a:t>13/04/2021</a:t>
             </a:fld>
             <a:endParaRPr lang="pt-PT" dirty="0"/>
           </a:p>
@@ -6086,7 +6103,7 @@
           <a:p>
             <a:fld id="{471B0E21-55E2-436E-8072-0F7F3758AA5E}" type="datetimeFigureOut">
               <a:rPr lang="pt-PT" smtClean="0"/>
-              <a:t>12/04/2021</a:t>
+              <a:t>13/04/2021</a:t>
             </a:fld>
             <a:endParaRPr lang="pt-PT" dirty="0"/>
           </a:p>
@@ -6340,7 +6357,7 @@
           <a:p>
             <a:fld id="{471B0E21-55E2-436E-8072-0F7F3758AA5E}" type="datetimeFigureOut">
               <a:rPr lang="pt-PT" smtClean="0"/>
-              <a:t>12/04/2021</a:t>
+              <a:t>13/04/2021</a:t>
             </a:fld>
             <a:endParaRPr lang="pt-PT" dirty="0"/>
           </a:p>
@@ -7424,6 +7441,13 @@
   <p:clrMapOvr>
     <a:masterClrMapping/>
   </p:clrMapOvr>
+  <p:timing>
+    <p:tnLst>
+      <p:par>
+        <p:cTn id="1" dur="indefinite" restart="never" nodeType="tmRoot"/>
+      </p:par>
+    </p:tnLst>
+  </p:timing>
 </p:sld>
 </file>
 
@@ -7488,7 +7512,7 @@
       </p:sp>
       <p:pic>
         <p:nvPicPr>
-          <p:cNvPr id="5" name="Imagem 4"/>
+          <p:cNvPr id="3" name="Imagem 2"/>
           <p:cNvPicPr>
             <a:picLocks noChangeAspect="1"/>
           </p:cNvPicPr>
@@ -7508,8 +7532,8 @@
         </p:blipFill>
         <p:spPr>
           <a:xfrm>
-            <a:off x="430304" y="384858"/>
-            <a:ext cx="11376213" cy="6065690"/>
+            <a:off x="412376" y="418237"/>
+            <a:ext cx="11322424" cy="6037010"/>
           </a:xfrm>
           <a:prstGeom prst="rect">
             <a:avLst/>
@@ -7526,6 +7550,13 @@
   <p:clrMapOvr>
     <a:masterClrMapping/>
   </p:clrMapOvr>
+  <p:timing>
+    <p:tnLst>
+      <p:par>
+        <p:cTn id="1" dur="indefinite" restart="never" nodeType="tmRoot"/>
+      </p:par>
+    </p:tnLst>
+  </p:timing>
 </p:sld>
 </file>
 
@@ -7759,6 +7790,13 @@
   <p:clrMapOvr>
     <a:masterClrMapping/>
   </p:clrMapOvr>
+  <p:timing>
+    <p:tnLst>
+      <p:par>
+        <p:cTn id="1" dur="indefinite" restart="never" nodeType="tmRoot"/>
+      </p:par>
+    </p:tnLst>
+  </p:timing>
 </p:sld>
 </file>
 
@@ -8106,7 +8144,7 @@
       </p:sp>
       <p:pic>
         <p:nvPicPr>
-          <p:cNvPr id="3" name="Imagem 2"/>
+          <p:cNvPr id="4" name="Imagem 3"/>
           <p:cNvPicPr>
             <a:picLocks noChangeAspect="1"/>
           </p:cNvPicPr>
@@ -8126,8 +8164,8 @@
         </p:blipFill>
         <p:spPr>
           <a:xfrm>
-            <a:off x="398173" y="430309"/>
-            <a:ext cx="11123012" cy="5958253"/>
+            <a:off x="403412" y="369749"/>
+            <a:ext cx="11403106" cy="6108291"/>
           </a:xfrm>
           <a:prstGeom prst="rect">
             <a:avLst/>

</xml_diff>